<commit_message>
Updated MEKON-HOBO in a nutshell.pptx
</commit_message>
<xml_diff>
--- a/docs/MEKON-HOBO in a nutshell.pptx
+++ b/docs/MEKON-HOBO in a nutshell.pptx
@@ -10,11 +10,7 @@
     <p:sldId id="282" r:id="rId4"/>
     <p:sldId id="283" r:id="rId5"/>
     <p:sldId id="284" r:id="rId6"/>
-    <p:sldId id="257" r:id="rId7"/>
-    <p:sldId id="278" r:id="rId8"/>
-    <p:sldId id="279" r:id="rId9"/>
-    <p:sldId id="265" r:id="rId10"/>
-    <p:sldId id="268" r:id="rId11"/>
+    <p:sldId id="285" r:id="rId7"/>
   </p:sldIdLst>
   <p:sldSz cx="9144000" cy="6858000" type="screen4x3"/>
   <p:notesSz cx="6858000" cy="9144000"/>
@@ -298,7 +294,7 @@
             <a:fld id="{766BFC5D-BA65-4295-843C-5BFF75191D5F}" type="datetimeFigureOut">
               <a:rPr lang="en-GB" smtClean="0"/>
               <a:pPr/>
-              <a:t>07/04/2016</a:t>
+              <a:t>13/04/2016</a:t>
             </a:fld>
             <a:endParaRPr lang="en-GB"/>
           </a:p>
@@ -465,7 +461,7 @@
             <a:fld id="{766BFC5D-BA65-4295-843C-5BFF75191D5F}" type="datetimeFigureOut">
               <a:rPr lang="en-GB" smtClean="0"/>
               <a:pPr/>
-              <a:t>07/04/2016</a:t>
+              <a:t>13/04/2016</a:t>
             </a:fld>
             <a:endParaRPr lang="en-GB"/>
           </a:p>
@@ -642,7 +638,7 @@
             <a:fld id="{766BFC5D-BA65-4295-843C-5BFF75191D5F}" type="datetimeFigureOut">
               <a:rPr lang="en-GB" smtClean="0"/>
               <a:pPr/>
-              <a:t>07/04/2016</a:t>
+              <a:t>13/04/2016</a:t>
             </a:fld>
             <a:endParaRPr lang="en-GB"/>
           </a:p>
@@ -809,7 +805,7 @@
             <a:fld id="{766BFC5D-BA65-4295-843C-5BFF75191D5F}" type="datetimeFigureOut">
               <a:rPr lang="en-GB" smtClean="0"/>
               <a:pPr/>
-              <a:t>07/04/2016</a:t>
+              <a:t>13/04/2016</a:t>
             </a:fld>
             <a:endParaRPr lang="en-GB"/>
           </a:p>
@@ -1052,7 +1048,7 @@
             <a:fld id="{766BFC5D-BA65-4295-843C-5BFF75191D5F}" type="datetimeFigureOut">
               <a:rPr lang="en-GB" smtClean="0"/>
               <a:pPr/>
-              <a:t>07/04/2016</a:t>
+              <a:t>13/04/2016</a:t>
             </a:fld>
             <a:endParaRPr lang="en-GB"/>
           </a:p>
@@ -1337,7 +1333,7 @@
             <a:fld id="{766BFC5D-BA65-4295-843C-5BFF75191D5F}" type="datetimeFigureOut">
               <a:rPr lang="en-GB" smtClean="0"/>
               <a:pPr/>
-              <a:t>07/04/2016</a:t>
+              <a:t>13/04/2016</a:t>
             </a:fld>
             <a:endParaRPr lang="en-GB"/>
           </a:p>
@@ -1756,7 +1752,7 @@
             <a:fld id="{766BFC5D-BA65-4295-843C-5BFF75191D5F}" type="datetimeFigureOut">
               <a:rPr lang="en-GB" smtClean="0"/>
               <a:pPr/>
-              <a:t>07/04/2016</a:t>
+              <a:t>13/04/2016</a:t>
             </a:fld>
             <a:endParaRPr lang="en-GB"/>
           </a:p>
@@ -1871,7 +1867,7 @@
             <a:fld id="{766BFC5D-BA65-4295-843C-5BFF75191D5F}" type="datetimeFigureOut">
               <a:rPr lang="en-GB" smtClean="0"/>
               <a:pPr/>
-              <a:t>07/04/2016</a:t>
+              <a:t>13/04/2016</a:t>
             </a:fld>
             <a:endParaRPr lang="en-GB"/>
           </a:p>
@@ -1963,7 +1959,7 @@
             <a:fld id="{766BFC5D-BA65-4295-843C-5BFF75191D5F}" type="datetimeFigureOut">
               <a:rPr lang="en-GB" smtClean="0"/>
               <a:pPr/>
-              <a:t>07/04/2016</a:t>
+              <a:t>13/04/2016</a:t>
             </a:fld>
             <a:endParaRPr lang="en-GB"/>
           </a:p>
@@ -2237,7 +2233,7 @@
             <a:fld id="{766BFC5D-BA65-4295-843C-5BFF75191D5F}" type="datetimeFigureOut">
               <a:rPr lang="en-GB" smtClean="0"/>
               <a:pPr/>
-              <a:t>07/04/2016</a:t>
+              <a:t>13/04/2016</a:t>
             </a:fld>
             <a:endParaRPr lang="en-GB"/>
           </a:p>
@@ -2487,7 +2483,7 @@
             <a:fld id="{766BFC5D-BA65-4295-843C-5BFF75191D5F}" type="datetimeFigureOut">
               <a:rPr lang="en-GB" smtClean="0"/>
               <a:pPr/>
-              <a:t>07/04/2016</a:t>
+              <a:t>13/04/2016</a:t>
             </a:fld>
             <a:endParaRPr lang="en-GB"/>
           </a:p>
@@ -2700,7 +2696,7 @@
             <a:fld id="{766BFC5D-BA65-4295-843C-5BFF75191D5F}" type="datetimeFigureOut">
               <a:rPr lang="en-GB" smtClean="0"/>
               <a:pPr/>
-              <a:t>07/04/2016</a:t>
+              <a:t>13/04/2016</a:t>
             </a:fld>
             <a:endParaRPr lang="en-GB"/>
           </a:p>
@@ -3083,8 +3079,8 @@
         </p:nvSpPr>
         <p:spPr>
           <a:xfrm>
-            <a:off x="467544" y="188640"/>
-            <a:ext cx="8229600" cy="1008112"/>
+            <a:off x="395536" y="188640"/>
+            <a:ext cx="8301608" cy="1008112"/>
           </a:xfrm>
         </p:spPr>
         <p:txBody>
@@ -3241,11 +3237,15 @@
             </a:pPr>
             <a:r>
               <a:rPr lang="en-GB" sz="2400" i="1" dirty="0" smtClean="0"/>
-              <a:t>Almost(!)</a:t>
+              <a:t>Almost (!)</a:t>
             </a:r>
             <a:r>
               <a:rPr lang="en-GB" sz="2400" dirty="0" smtClean="0"/>
-              <a:t> products:</a:t>
+              <a:t> </a:t>
+            </a:r>
+            <a:r>
+              <a:rPr lang="en-GB" sz="2400" dirty="0" smtClean="0"/>
+              <a:t>products:</a:t>
             </a:r>
           </a:p>
           <a:p>
@@ -3313,7 +3313,11 @@
             </a:pPr>
             <a:r>
               <a:rPr lang="en-GB" sz="2200" b="1" dirty="0" smtClean="0"/>
-              <a:t>Sepsis prediction </a:t>
+              <a:t>Sepsis </a:t>
+            </a:r>
+            <a:r>
+              <a:rPr lang="en-GB" sz="2200" b="1" dirty="0" smtClean="0"/>
+              <a:t>prediction </a:t>
             </a:r>
             <a:r>
               <a:rPr lang="en-GB" sz="2200" dirty="0" smtClean="0"/>
@@ -3335,607 +3339,6 @@
             <a:r>
               <a:rPr lang="en-GB" sz="2200" dirty="0" smtClean="0"/>
               <a:t>design/design-retrieval system</a:t>
-            </a:r>
-          </a:p>
-        </p:txBody>
-      </p:sp>
-    </p:spTree>
-  </p:cSld>
-  <p:clrMapOvr>
-    <a:masterClrMapping/>
-  </p:clrMapOvr>
-  <p:timing>
-    <p:tnLst>
-      <p:par>
-        <p:cTn id="1" dur="indefinite" restart="never" nodeType="tmRoot"/>
-      </p:par>
-    </p:tnLst>
-  </p:timing>
-</p:sld>
-</file>
-
-<file path=ppt/slides/slide10.xml><?xml version="1.0" encoding="utf-8"?>
-<p:sld xmlns:a="http://schemas.openxmlformats.org/drawingml/2006/main" xmlns:r="http://schemas.openxmlformats.org/officeDocument/2006/relationships" xmlns:p="http://schemas.openxmlformats.org/presentationml/2006/main">
-  <p:cSld>
-    <p:spTree>
-      <p:nvGrpSpPr>
-        <p:cNvPr id="1" name=""/>
-        <p:cNvGrpSpPr/>
-        <p:nvPr/>
-      </p:nvGrpSpPr>
-      <p:grpSpPr>
-        <a:xfrm>
-          <a:off x="0" y="0"/>
-          <a:ext cx="0" cy="0"/>
-          <a:chOff x="0" y="0"/>
-          <a:chExt cx="0" cy="0"/>
-        </a:xfrm>
-      </p:grpSpPr>
-      <p:sp>
-        <p:nvSpPr>
-          <p:cNvPr id="2" name="Title 1"/>
-          <p:cNvSpPr>
-            <a:spLocks noGrp="1"/>
-          </p:cNvSpPr>
-          <p:nvPr>
-            <p:ph type="title"/>
-          </p:nvPr>
-        </p:nvSpPr>
-        <p:spPr>
-          <a:xfrm>
-            <a:off x="467544" y="188640"/>
-            <a:ext cx="8229600" cy="1008112"/>
-          </a:xfrm>
-        </p:spPr>
-        <p:txBody>
-          <a:bodyPr/>
-          <a:lstStyle/>
-          <a:p>
-            <a:r>
-              <a:rPr lang="en-GB" dirty="0" smtClean="0"/>
-              <a:t>Why use </a:t>
-            </a:r>
-            <a:r>
-              <a:rPr lang="en-GB" b="1" dirty="0" smtClean="0">
-                <a:solidFill>
-                  <a:srgbClr val="009900"/>
-                </a:solidFill>
-              </a:rPr>
-              <a:t>MEKON</a:t>
-            </a:r>
-            <a:r>
-              <a:rPr lang="en-GB" b="1" dirty="0" smtClean="0"/>
-              <a:t> </a:t>
-            </a:r>
-            <a:r>
-              <a:rPr lang="en-GB" dirty="0" smtClean="0"/>
-              <a:t>+</a:t>
-            </a:r>
-            <a:r>
-              <a:rPr lang="en-GB" b="1" dirty="0" smtClean="0"/>
-              <a:t> </a:t>
-            </a:r>
-            <a:r>
-              <a:rPr lang="en-GB" b="1" dirty="0" smtClean="0">
-                <a:solidFill>
-                  <a:srgbClr val="1E09B7"/>
-                </a:solidFill>
-              </a:rPr>
-              <a:t>HOBO</a:t>
-            </a:r>
-            <a:r>
-              <a:rPr lang="en-GB" dirty="0" smtClean="0"/>
-              <a:t>?</a:t>
-            </a:r>
-            <a:endParaRPr lang="en-GB" b="1" dirty="0">
-              <a:solidFill>
-                <a:srgbClr val="1E09B7"/>
-              </a:solidFill>
-            </a:endParaRPr>
-          </a:p>
-        </p:txBody>
-      </p:sp>
-      <p:sp>
-        <p:nvSpPr>
-          <p:cNvPr id="3" name="Content Placeholder 2"/>
-          <p:cNvSpPr>
-            <a:spLocks noGrp="1"/>
-          </p:cNvSpPr>
-          <p:nvPr>
-            <p:ph idx="1"/>
-          </p:nvPr>
-        </p:nvSpPr>
-        <p:spPr>
-          <a:xfrm>
-            <a:off x="1331640" y="1340768"/>
-            <a:ext cx="6336704" cy="4968552"/>
-          </a:xfrm>
-          <a:solidFill>
-            <a:schemeClr val="accent3">
-              <a:lumMod val="40000"/>
-              <a:lumOff val="60000"/>
-            </a:schemeClr>
-          </a:solidFill>
-          <a:ln w="28575">
-            <a:solidFill>
-              <a:schemeClr val="tx1"/>
-            </a:solidFill>
-          </a:ln>
-        </p:spPr>
-        <p:txBody>
-          <a:bodyPr>
-            <a:normAutofit/>
-          </a:bodyPr>
-          <a:lstStyle/>
-          <a:p>
-            <a:pPr>
-              <a:buNone/>
-            </a:pPr>
-            <a:r>
-              <a:rPr lang="en-GB" sz="2500" dirty="0" smtClean="0"/>
-              <a:t>For </a:t>
-            </a:r>
-            <a:r>
-              <a:rPr lang="en-GB" sz="2500" b="1" dirty="0" smtClean="0"/>
-              <a:t>ontology developers</a:t>
-            </a:r>
-            <a:r>
-              <a:rPr lang="en-GB" sz="2500" dirty="0" smtClean="0"/>
-              <a:t>, </a:t>
-            </a:r>
-            <a:r>
-              <a:rPr lang="en-GB" sz="2500" b="1" dirty="0" smtClean="0">
-                <a:solidFill>
-                  <a:srgbClr val="009900"/>
-                </a:solidFill>
-              </a:rPr>
-              <a:t>MEKON</a:t>
-            </a:r>
-            <a:r>
-              <a:rPr lang="en-GB" sz="2500" b="1" dirty="0" smtClean="0">
-                <a:solidFill>
-                  <a:srgbClr val="FF0000"/>
-                </a:solidFill>
-              </a:rPr>
-              <a:t> </a:t>
-            </a:r>
-            <a:r>
-              <a:rPr lang="en-GB" sz="2500" dirty="0" smtClean="0"/>
-              <a:t>enables the creation of a </a:t>
-            </a:r>
-            <a:r>
-              <a:rPr lang="en-GB" sz="2500" b="1" dirty="0" smtClean="0"/>
-              <a:t>skeleton application</a:t>
-            </a:r>
-            <a:r>
-              <a:rPr lang="en-GB" sz="2500" dirty="0" smtClean="0"/>
-              <a:t>, </a:t>
-            </a:r>
-            <a:r>
-              <a:rPr lang="en-GB" sz="2500" i="1" dirty="0" smtClean="0"/>
-              <a:t>without having to write a single line of code</a:t>
-            </a:r>
-            <a:endParaRPr lang="en-GB" sz="2500" dirty="0" smtClean="0"/>
-          </a:p>
-          <a:p>
-            <a:pPr>
-              <a:buNone/>
-            </a:pPr>
-            <a:endParaRPr lang="en-GB" sz="2700" dirty="0" smtClean="0"/>
-          </a:p>
-        </p:txBody>
-      </p:sp>
-      <p:sp>
-        <p:nvSpPr>
-          <p:cNvPr id="4" name="Content Placeholder 2"/>
-          <p:cNvSpPr txBox="1">
-            <a:spLocks/>
-          </p:cNvSpPr>
-          <p:nvPr/>
-        </p:nvSpPr>
-        <p:spPr>
-          <a:xfrm>
-            <a:off x="1763688" y="2924944"/>
-            <a:ext cx="5472608" cy="3024336"/>
-          </a:xfrm>
-          <a:prstGeom prst="rect">
-            <a:avLst/>
-          </a:prstGeom>
-          <a:solidFill>
-            <a:schemeClr val="accent4">
-              <a:lumMod val="20000"/>
-              <a:lumOff val="80000"/>
-            </a:schemeClr>
-          </a:solidFill>
-          <a:ln w="28575">
-            <a:solidFill>
-              <a:schemeClr val="tx1"/>
-            </a:solidFill>
-          </a:ln>
-        </p:spPr>
-        <p:txBody>
-          <a:bodyPr vert="horz" lIns="91440" tIns="45720" rIns="91440" bIns="45720" rtlCol="0">
-            <a:normAutofit lnSpcReduction="10000"/>
-          </a:bodyPr>
-          <a:lstStyle/>
-          <a:p>
-            <a:pPr marL="342900" marR="0" lvl="0" indent="-342900" algn="ctr" defTabSz="914400" rtl="0" eaLnBrk="1" fontAlgn="auto" latinLnBrk="0" hangingPunct="1">
-              <a:lnSpc>
-                <a:spcPct val="100000"/>
-              </a:lnSpc>
-              <a:spcBef>
-                <a:spcPct val="20000"/>
-              </a:spcBef>
-              <a:spcAft>
-                <a:spcPts val="0"/>
-              </a:spcAft>
-              <a:buClrTx/>
-              <a:buSzTx/>
-              <a:buFont typeface="Arial" pitchFamily="34" charset="0"/>
-              <a:buNone/>
-              <a:tabLst/>
-              <a:defRPr/>
-            </a:pPr>
-            <a:r>
-              <a:rPr lang="en-GB" sz="2500" b="1" dirty="0" smtClean="0">
-                <a:solidFill>
-                  <a:srgbClr val="FF0000"/>
-                </a:solidFill>
-              </a:rPr>
-              <a:t>O</a:t>
-            </a:r>
-            <a:r>
-              <a:rPr kumimoji="0" lang="en-GB" sz="2500" b="1" i="0" u="none" strike="noStrike" kern="1200" cap="none" spc="0" normalizeH="0" baseline="0" noProof="0" dirty="0" smtClean="0">
-                <a:ln>
-                  <a:noFill/>
-                </a:ln>
-                <a:solidFill>
-                  <a:srgbClr val="FF0000"/>
-                </a:solidFill>
-                <a:effectLst/>
-                <a:uLnTx/>
-                <a:uFillTx/>
-                <a:latin typeface="+mn-lt"/>
-                <a:ea typeface="+mn-ea"/>
-                <a:cs typeface="+mn-cs"/>
-              </a:rPr>
-              <a:t>WL Ontology</a:t>
-            </a:r>
-          </a:p>
-          <a:p>
-            <a:pPr marL="342900" marR="0" lvl="0" indent="-342900" algn="ctr" defTabSz="914400" rtl="0" eaLnBrk="1" fontAlgn="auto" latinLnBrk="0" hangingPunct="1">
-              <a:lnSpc>
-                <a:spcPct val="100000"/>
-              </a:lnSpc>
-              <a:spcBef>
-                <a:spcPct val="20000"/>
-              </a:spcBef>
-              <a:spcAft>
-                <a:spcPts val="0"/>
-              </a:spcAft>
-              <a:buClrTx/>
-              <a:buSzTx/>
-              <a:buFont typeface="Arial" pitchFamily="34" charset="0"/>
-              <a:buNone/>
-              <a:tabLst/>
-              <a:defRPr/>
-            </a:pPr>
-            <a:r>
-              <a:rPr kumimoji="0" lang="en-GB" sz="2500" i="0" u="none" strike="noStrike" kern="1200" cap="none" spc="0" normalizeH="0" baseline="0" noProof="0" dirty="0" smtClean="0">
-                <a:ln>
-                  <a:noFill/>
-                </a:ln>
-                <a:solidFill>
-                  <a:schemeClr val="accent4">
-                    <a:lumMod val="50000"/>
-                  </a:schemeClr>
-                </a:solidFill>
-                <a:effectLst/>
-                <a:uLnTx/>
-                <a:uFillTx/>
-                <a:latin typeface="+mn-lt"/>
-                <a:ea typeface="+mn-ea"/>
-                <a:cs typeface="+mn-cs"/>
-              </a:rPr>
-              <a:t>+ </a:t>
-            </a:r>
-            <a:r>
-              <a:rPr kumimoji="0" lang="en-GB" sz="2500" b="1" i="0" u="none" strike="noStrike" kern="1200" cap="none" spc="0" normalizeH="0" baseline="0" noProof="0" dirty="0" smtClean="0">
-                <a:ln>
-                  <a:noFill/>
-                </a:ln>
-                <a:solidFill>
-                  <a:srgbClr val="FF0000"/>
-                </a:solidFill>
-                <a:effectLst/>
-                <a:uLnTx/>
-                <a:uFillTx/>
-                <a:latin typeface="+mn-lt"/>
-                <a:ea typeface="+mn-ea"/>
-                <a:cs typeface="+mn-cs"/>
-              </a:rPr>
-              <a:t>DL </a:t>
-            </a:r>
-            <a:r>
-              <a:rPr kumimoji="0" lang="en-GB" sz="2500" b="1" i="0" u="none" strike="noStrike" kern="1200" cap="none" spc="0" normalizeH="0" baseline="0" noProof="0" dirty="0" err="1" smtClean="0">
-                <a:ln>
-                  <a:noFill/>
-                </a:ln>
-                <a:solidFill>
-                  <a:srgbClr val="FF0000"/>
-                </a:solidFill>
-                <a:effectLst/>
-                <a:uLnTx/>
-                <a:uFillTx/>
-                <a:latin typeface="+mn-lt"/>
-                <a:ea typeface="+mn-ea"/>
-                <a:cs typeface="+mn-cs"/>
-              </a:rPr>
-              <a:t>Reasoner</a:t>
-            </a:r>
-            <a:endParaRPr lang="en-GB" sz="2500" b="1" dirty="0" smtClean="0">
-              <a:solidFill>
-                <a:srgbClr val="FF0000"/>
-              </a:solidFill>
-            </a:endParaRPr>
-          </a:p>
-          <a:p>
-            <a:pPr marL="342900" marR="0" lvl="0" indent="-342900" algn="ctr" defTabSz="914400" rtl="0" eaLnBrk="1" fontAlgn="auto" latinLnBrk="0" hangingPunct="1">
-              <a:lnSpc>
-                <a:spcPct val="100000"/>
-              </a:lnSpc>
-              <a:spcBef>
-                <a:spcPct val="20000"/>
-              </a:spcBef>
-              <a:spcAft>
-                <a:spcPts val="0"/>
-              </a:spcAft>
-              <a:buClrTx/>
-              <a:buSzTx/>
-              <a:buFont typeface="Arial" pitchFamily="34" charset="0"/>
-              <a:buNone/>
-              <a:tabLst/>
-              <a:defRPr/>
-            </a:pPr>
-            <a:r>
-              <a:rPr kumimoji="0" lang="en-GB" sz="2500" i="0" u="none" strike="noStrike" kern="1200" cap="none" spc="0" normalizeH="0" baseline="0" noProof="0" dirty="0" smtClean="0">
-                <a:ln>
-                  <a:noFill/>
-                </a:ln>
-                <a:solidFill>
-                  <a:schemeClr val="accent4">
-                    <a:lumMod val="50000"/>
-                  </a:schemeClr>
-                </a:solidFill>
-                <a:effectLst/>
-                <a:uLnTx/>
-                <a:uFillTx/>
-                <a:latin typeface="+mn-lt"/>
-                <a:ea typeface="+mn-ea"/>
-                <a:cs typeface="+mn-cs"/>
-              </a:rPr>
-              <a:t>+ </a:t>
-            </a:r>
-            <a:r>
-              <a:rPr kumimoji="0" lang="en-GB" sz="2500" b="1" i="0" u="none" strike="noStrike" kern="1200" cap="none" spc="0" normalizeH="0" baseline="0" noProof="0" dirty="0" smtClean="0">
-                <a:ln>
-                  <a:noFill/>
-                </a:ln>
-                <a:solidFill>
-                  <a:srgbClr val="009900"/>
-                </a:solidFill>
-                <a:effectLst/>
-                <a:uLnTx/>
-                <a:uFillTx/>
-                <a:latin typeface="+mn-lt"/>
-                <a:ea typeface="+mn-ea"/>
-                <a:cs typeface="+mn-cs"/>
-              </a:rPr>
-              <a:t>MEKON</a:t>
-            </a:r>
-            <a:r>
-              <a:rPr kumimoji="0" lang="en-GB" sz="2500" i="0" u="none" strike="noStrike" kern="1200" cap="none" spc="0" normalizeH="0" baseline="0" noProof="0" dirty="0" smtClean="0">
-                <a:ln>
-                  <a:noFill/>
-                </a:ln>
-                <a:solidFill>
-                  <a:schemeClr val="accent4">
-                    <a:lumMod val="50000"/>
-                  </a:schemeClr>
-                </a:solidFill>
-                <a:effectLst/>
-                <a:uLnTx/>
-                <a:uFillTx/>
-                <a:latin typeface="+mn-lt"/>
-                <a:ea typeface="+mn-ea"/>
-                <a:cs typeface="+mn-cs"/>
-              </a:rPr>
-              <a:t> Framework</a:t>
-            </a:r>
-          </a:p>
-          <a:p>
-            <a:pPr marL="342900" lvl="0" indent="-342900" algn="ctr">
-              <a:spcBef>
-                <a:spcPct val="20000"/>
-              </a:spcBef>
-              <a:defRPr/>
-            </a:pPr>
-            <a:r>
-              <a:rPr kumimoji="0" lang="en-GB" sz="2500" i="0" u="none" strike="noStrike" kern="1200" cap="none" spc="0" normalizeH="0" baseline="0" noProof="0" dirty="0" smtClean="0">
-                <a:ln>
-                  <a:noFill/>
-                </a:ln>
-                <a:solidFill>
-                  <a:schemeClr val="accent4">
-                    <a:lumMod val="50000"/>
-                  </a:schemeClr>
-                </a:solidFill>
-                <a:effectLst/>
-                <a:uLnTx/>
-                <a:uFillTx/>
-                <a:latin typeface="+mn-lt"/>
-                <a:ea typeface="+mn-ea"/>
-                <a:cs typeface="+mn-cs"/>
-              </a:rPr>
-              <a:t>+ </a:t>
-            </a:r>
-            <a:r>
-              <a:rPr lang="en-GB" sz="2500" b="1" dirty="0" smtClean="0">
-                <a:solidFill>
-                  <a:srgbClr val="009900"/>
-                </a:solidFill>
-              </a:rPr>
-              <a:t>MEKON</a:t>
-            </a:r>
-            <a:r>
-              <a:rPr lang="en-GB" sz="2500" dirty="0" smtClean="0">
-                <a:solidFill>
-                  <a:schemeClr val="accent4">
-                    <a:lumMod val="50000"/>
-                  </a:schemeClr>
-                </a:solidFill>
-              </a:rPr>
-              <a:t> Configuration </a:t>
-            </a:r>
-            <a:r>
-              <a:rPr kumimoji="0" lang="en-GB" sz="2500" i="0" u="none" strike="noStrike" kern="1200" cap="none" spc="0" normalizeH="0" baseline="0" noProof="0" dirty="0" smtClean="0">
-                <a:ln>
-                  <a:noFill/>
-                </a:ln>
-                <a:solidFill>
-                  <a:schemeClr val="accent4">
-                    <a:lumMod val="50000"/>
-                  </a:schemeClr>
-                </a:solidFill>
-                <a:effectLst/>
-                <a:uLnTx/>
-                <a:uFillTx/>
-                <a:latin typeface="+mn-lt"/>
-                <a:ea typeface="+mn-ea"/>
-                <a:cs typeface="+mn-cs"/>
-              </a:rPr>
-              <a:t>File</a:t>
-            </a:r>
-          </a:p>
-          <a:p>
-            <a:pPr marL="342900" indent="-342900" algn="ctr">
-              <a:spcBef>
-                <a:spcPct val="20000"/>
-              </a:spcBef>
-              <a:defRPr/>
-            </a:pPr>
-            <a:r>
-              <a:rPr lang="en-GB" sz="2500" dirty="0" smtClean="0">
-                <a:solidFill>
-                  <a:schemeClr val="accent4">
-                    <a:lumMod val="50000"/>
-                  </a:schemeClr>
-                </a:solidFill>
-              </a:rPr>
-              <a:t>+ </a:t>
-            </a:r>
-            <a:r>
-              <a:rPr lang="en-GB" sz="2500" b="1" dirty="0" smtClean="0">
-                <a:solidFill>
-                  <a:schemeClr val="accent6">
-                    <a:lumMod val="75000"/>
-                  </a:schemeClr>
-                </a:solidFill>
-              </a:rPr>
-              <a:t>Model Explorer</a:t>
-            </a:r>
-            <a:endParaRPr kumimoji="0" lang="en-GB" sz="2500" i="0" u="none" strike="noStrike" kern="1200" cap="none" spc="0" normalizeH="0" baseline="0" noProof="0" dirty="0" smtClean="0">
-              <a:ln>
-                <a:noFill/>
-              </a:ln>
-              <a:solidFill>
-                <a:schemeClr val="accent4">
-                  <a:lumMod val="50000"/>
-                </a:schemeClr>
-              </a:solidFill>
-              <a:effectLst/>
-              <a:uLnTx/>
-              <a:uFillTx/>
-              <a:latin typeface="+mn-lt"/>
-              <a:ea typeface="+mn-ea"/>
-              <a:cs typeface="+mn-cs"/>
-            </a:endParaRPr>
-          </a:p>
-          <a:p>
-            <a:pPr marL="342900" marR="0" lvl="0" indent="-342900" algn="ctr" defTabSz="914400" rtl="0" eaLnBrk="1" fontAlgn="auto" latinLnBrk="0" hangingPunct="1">
-              <a:lnSpc>
-                <a:spcPct val="100000"/>
-              </a:lnSpc>
-              <a:spcBef>
-                <a:spcPct val="20000"/>
-              </a:spcBef>
-              <a:spcAft>
-                <a:spcPts val="0"/>
-              </a:spcAft>
-              <a:buClrTx/>
-              <a:buSzTx/>
-              <a:buFont typeface="Arial" pitchFamily="34" charset="0"/>
-              <a:buNone/>
-              <a:tabLst/>
-              <a:defRPr/>
-            </a:pPr>
-            <a:r>
-              <a:rPr kumimoji="0" lang="en-GB" sz="2500" i="0" u="none" strike="noStrike" kern="1200" cap="none" spc="0" normalizeH="0" baseline="0" noProof="0" dirty="0" smtClean="0">
-                <a:ln>
-                  <a:noFill/>
-                </a:ln>
-                <a:solidFill>
-                  <a:schemeClr val="accent4">
-                    <a:lumMod val="50000"/>
-                  </a:schemeClr>
-                </a:solidFill>
-                <a:effectLst/>
-                <a:uLnTx/>
-                <a:uFillTx/>
-                <a:latin typeface="+mn-lt"/>
-                <a:ea typeface="+mn-ea"/>
-                <a:cs typeface="+mn-cs"/>
-                <a:sym typeface="Wingdings" pitchFamily="2" charset="2"/>
-              </a:rPr>
-              <a:t></a:t>
-            </a:r>
-          </a:p>
-          <a:p>
-            <a:pPr marL="342900" marR="0" lvl="0" indent="-342900" algn="ctr" defTabSz="914400" rtl="0" eaLnBrk="1" fontAlgn="auto" latinLnBrk="0" hangingPunct="1">
-              <a:lnSpc>
-                <a:spcPct val="100000"/>
-              </a:lnSpc>
-              <a:spcBef>
-                <a:spcPct val="20000"/>
-              </a:spcBef>
-              <a:spcAft>
-                <a:spcPts val="0"/>
-              </a:spcAft>
-              <a:buClrTx/>
-              <a:buSzTx/>
-              <a:buFont typeface="Arial" pitchFamily="34" charset="0"/>
-              <a:buNone/>
-              <a:tabLst/>
-              <a:defRPr/>
-            </a:pPr>
-            <a:r>
-              <a:rPr kumimoji="0" lang="en-GB" sz="2500" i="0" u="none" strike="noStrike" kern="1200" cap="none" spc="0" normalizeH="0" baseline="0" noProof="0" dirty="0" smtClean="0">
-                <a:ln>
-                  <a:noFill/>
-                </a:ln>
-                <a:solidFill>
-                  <a:schemeClr val="accent4">
-                    <a:lumMod val="50000"/>
-                  </a:schemeClr>
-                </a:solidFill>
-                <a:effectLst/>
-                <a:uLnTx/>
-                <a:uFillTx/>
-                <a:latin typeface="+mn-lt"/>
-                <a:ea typeface="+mn-ea"/>
-                <a:cs typeface="+mn-cs"/>
-              </a:rPr>
-              <a:t>Skeleton OWL-Driven Application</a:t>
             </a:r>
           </a:p>
         </p:txBody>
@@ -3984,7 +3387,7 @@
         </p:nvSpPr>
         <p:spPr>
           <a:xfrm>
-            <a:off x="467544" y="188640"/>
+            <a:off x="467544" y="0"/>
             <a:ext cx="8229600" cy="1008112"/>
           </a:xfrm>
         </p:spPr>
@@ -3994,11 +3397,7 @@
           <a:p>
             <a:r>
               <a:rPr lang="en-GB" dirty="0" smtClean="0"/>
-              <a:t>Very, very </a:t>
-            </a:r>
-            <a:r>
-              <a:rPr lang="en-GB" dirty="0" smtClean="0"/>
-              <a:t>briefly</a:t>
+              <a:t>Very, very briefly</a:t>
             </a:r>
             <a:endParaRPr lang="en-GB" b="1" dirty="0">
               <a:solidFill>
@@ -4020,7 +3419,7 @@
         </p:nvSpPr>
         <p:spPr>
           <a:xfrm>
-            <a:off x="683568" y="1268760"/>
+            <a:off x="755576" y="1052736"/>
             <a:ext cx="7632848" cy="2736304"/>
           </a:xfrm>
           <a:solidFill>
@@ -4053,7 +3452,11 @@
             </a:r>
             <a:r>
               <a:rPr lang="en-GB" sz="2900" dirty="0" smtClean="0"/>
-              <a:t> based around </a:t>
+              <a:t> based </a:t>
+            </a:r>
+            <a:r>
+              <a:rPr lang="en-GB" sz="2900" dirty="0" smtClean="0"/>
+              <a:t>around a </a:t>
             </a:r>
             <a:r>
               <a:rPr lang="en-GB" sz="2900" b="1" dirty="0" smtClean="0"/>
@@ -4190,7 +3593,27 @@
                   <a:srgbClr val="FF0000"/>
                 </a:solidFill>
               </a:rPr>
-              <a:t>OWL + DL </a:t>
+              <a:t>OWL </a:t>
+            </a:r>
+            <a:r>
+              <a:rPr lang="en-GB" sz="2900" dirty="0" smtClean="0"/>
+              <a:t>+</a:t>
+            </a:r>
+            <a:r>
+              <a:rPr lang="en-GB" sz="2900" b="1" dirty="0" smtClean="0">
+                <a:solidFill>
+                  <a:srgbClr val="FF0000"/>
+                </a:solidFill>
+              </a:rPr>
+              <a:t> </a:t>
+            </a:r>
+            <a:r>
+              <a:rPr lang="en-GB" sz="2900" b="1" dirty="0" smtClean="0">
+                <a:solidFill>
+                  <a:srgbClr val="FF0000"/>
+                </a:solidFill>
+              </a:rPr>
+              <a:t>DL </a:t>
             </a:r>
             <a:r>
               <a:rPr lang="en-GB" sz="2900" dirty="0" smtClean="0"/>
@@ -4218,8 +3641,8 @@
         </p:nvSpPr>
         <p:spPr>
           <a:xfrm>
-            <a:off x="683568" y="4365104"/>
-            <a:ext cx="7632848" cy="2016224"/>
+            <a:off x="755576" y="4077072"/>
+            <a:ext cx="7632848" cy="2492896"/>
           </a:xfrm>
           <a:prstGeom prst="rect">
             <a:avLst/>
@@ -4237,7 +3660,7 @@
         </p:spPr>
         <p:txBody>
           <a:bodyPr vert="horz" lIns="91440" tIns="45720" rIns="91440" bIns="45720" rtlCol="0">
-            <a:normAutofit lnSpcReduction="10000"/>
+            <a:normAutofit/>
           </a:bodyPr>
           <a:lstStyle/>
           <a:p>
@@ -4247,7 +3670,7 @@
               </a:spcBef>
             </a:pPr>
             <a:r>
-              <a:rPr lang="en-GB" sz="2700" b="1" dirty="0" smtClean="0">
+              <a:rPr lang="en-GB" sz="2500" b="1" dirty="0" smtClean="0">
                 <a:solidFill>
                   <a:srgbClr val="1E09B7"/>
                 </a:solidFill>
@@ -4255,140 +3678,20 @@
               <a:t>HOBO</a:t>
             </a:r>
             <a:r>
-              <a:rPr lang="en-GB" sz="2700" dirty="0" smtClean="0"/>
-              <a:t> extends </a:t>
-            </a:r>
-            <a:r>
-              <a:rPr lang="en-GB" sz="2700" b="1" dirty="0" smtClean="0">
+              <a:rPr lang="en-GB" sz="2500" dirty="0" smtClean="0"/>
+              <a:t> </a:t>
+            </a:r>
+            <a:r>
+              <a:rPr lang="en-GB" sz="2500" dirty="0" smtClean="0"/>
+              <a:t>extends </a:t>
+            </a:r>
+            <a:r>
+              <a:rPr lang="en-GB" sz="2500" b="1" dirty="0" smtClean="0">
                 <a:solidFill>
                   <a:srgbClr val="009900"/>
                 </a:solidFill>
               </a:rPr>
               <a:t>MEKON</a:t>
-            </a:r>
-            <a:r>
-              <a:rPr lang="en-GB" sz="2700" dirty="0" smtClean="0"/>
-              <a:t>, enabling the creation of </a:t>
-            </a:r>
-            <a:r>
-              <a:rPr lang="en-GB" sz="2700" b="1" dirty="0" smtClean="0"/>
-              <a:t>domain-specific</a:t>
-            </a:r>
-            <a:r>
-              <a:rPr lang="en-GB" sz="2700" dirty="0" smtClean="0"/>
-              <a:t> </a:t>
-            </a:r>
-            <a:r>
-              <a:rPr lang="en-GB" sz="2700" b="1" dirty="0" smtClean="0">
-                <a:solidFill>
-                  <a:srgbClr val="1E09B7"/>
-                </a:solidFill>
-              </a:rPr>
-              <a:t>object models</a:t>
-            </a:r>
-            <a:endParaRPr lang="en-GB" sz="2700" dirty="0" smtClean="0"/>
-          </a:p>
-          <a:p>
-            <a:pPr marL="285750" indent="-285750">
-              <a:spcBef>
-                <a:spcPct val="20000"/>
-              </a:spcBef>
-              <a:buFont typeface="Wingdings" pitchFamily="2" charset="2"/>
-              <a:buChar char="§"/>
-            </a:pPr>
-            <a:r>
-              <a:rPr lang="en-GB" sz="2400" b="1" dirty="0" smtClean="0"/>
-              <a:t>Bound to </a:t>
-            </a:r>
-            <a:r>
-              <a:rPr lang="en-GB" sz="2400" dirty="0" smtClean="0"/>
-              <a:t>appropriately populated </a:t>
-            </a:r>
-            <a:r>
-              <a:rPr lang="en-GB" sz="2400" b="1" smtClean="0">
-                <a:solidFill>
-                  <a:srgbClr val="009900"/>
-                </a:solidFill>
-              </a:rPr>
-              <a:t>frames</a:t>
-            </a:r>
-            <a:r>
-              <a:rPr lang="en-GB" sz="2400" b="1" smtClean="0">
-                <a:solidFill>
-                  <a:srgbClr val="FF0000"/>
-                </a:solidFill>
-              </a:rPr>
-              <a:t> </a:t>
-            </a:r>
-            <a:r>
-              <a:rPr lang="en-GB" sz="2400" b="1" smtClean="0">
-                <a:solidFill>
-                  <a:srgbClr val="009900"/>
-                </a:solidFill>
-              </a:rPr>
-              <a:t>model</a:t>
-            </a:r>
-            <a:endParaRPr lang="en-GB" sz="2400" b="1" dirty="0" smtClean="0">
-              <a:solidFill>
-                <a:srgbClr val="009900"/>
-              </a:solidFill>
-            </a:endParaRPr>
-          </a:p>
-          <a:p>
-            <a:pPr marL="285750" indent="-285750">
-              <a:spcBef>
-                <a:spcPct val="20000"/>
-              </a:spcBef>
-              <a:buFont typeface="Wingdings" pitchFamily="2" charset="2"/>
-              <a:buChar char="§"/>
-            </a:pPr>
-            <a:r>
-              <a:rPr lang="en-GB" sz="2400" dirty="0" smtClean="0"/>
-              <a:t>Instantiations  of </a:t>
-            </a:r>
-            <a:r>
-              <a:rPr lang="en-GB" sz="2400" b="1" dirty="0" smtClean="0">
-                <a:solidFill>
-                  <a:srgbClr val="1E09B7"/>
-                </a:solidFill>
-              </a:rPr>
-              <a:t>object models </a:t>
-            </a:r>
-            <a:r>
-              <a:rPr lang="en-GB" sz="2400" dirty="0" smtClean="0"/>
-              <a:t>operate </a:t>
-            </a:r>
-            <a:r>
-              <a:rPr lang="en-GB" sz="2400" b="1" dirty="0" smtClean="0"/>
-              <a:t>in-tandem </a:t>
-            </a:r>
-            <a:r>
-              <a:rPr lang="en-GB" sz="2400" dirty="0" smtClean="0"/>
-              <a:t>with instantiations of </a:t>
-            </a:r>
-            <a:r>
-              <a:rPr lang="en-GB" sz="2400" b="1" dirty="0" smtClean="0">
-                <a:solidFill>
-                  <a:srgbClr val="009900"/>
-                </a:solidFill>
-              </a:rPr>
-              <a:t>frames</a:t>
-            </a:r>
-            <a:r>
-              <a:rPr lang="en-GB" sz="2400" b="1" dirty="0" smtClean="0">
-                <a:solidFill>
-                  <a:srgbClr val="FF0000"/>
-                </a:solidFill>
-              </a:rPr>
-              <a:t> </a:t>
-            </a:r>
-            <a:r>
-              <a:rPr lang="en-GB" sz="2400" b="1" dirty="0" smtClean="0">
-                <a:solidFill>
-                  <a:srgbClr val="009900"/>
-                </a:solidFill>
-              </a:rPr>
-              <a:t>model</a:t>
             </a:r>
           </a:p>
           <a:p>
@@ -4397,43 +3700,173 @@
                 <a:spcPct val="20000"/>
               </a:spcBef>
             </a:pPr>
-            <a:endParaRPr lang="en-GB" sz="2700" b="1" dirty="0" smtClean="0">
+            <a:endParaRPr lang="en-GB" sz="800" dirty="0" smtClean="0"/>
+          </a:p>
+          <a:p>
+            <a:pPr marL="285750" indent="-285750">
+              <a:spcBef>
+                <a:spcPct val="20000"/>
+              </a:spcBef>
+            </a:pPr>
+            <a:r>
+              <a:rPr lang="en-GB" sz="2500" dirty="0" smtClean="0"/>
+              <a:t>E</a:t>
+            </a:r>
+            <a:r>
+              <a:rPr lang="en-GB" sz="2500" dirty="0" smtClean="0"/>
+              <a:t>nables creation of </a:t>
+            </a:r>
+            <a:r>
+              <a:rPr lang="en-GB" sz="2500" b="1" dirty="0" smtClean="0"/>
+              <a:t>domain-specific</a:t>
+            </a:r>
+            <a:r>
+              <a:rPr lang="en-GB" sz="2500" dirty="0" smtClean="0"/>
+              <a:t> </a:t>
+            </a:r>
+            <a:r>
+              <a:rPr lang="en-GB" sz="2500" b="1" dirty="0" smtClean="0">
+                <a:solidFill>
+                  <a:srgbClr val="1E09B7"/>
+                </a:solidFill>
+              </a:rPr>
+              <a:t>object </a:t>
+            </a:r>
+            <a:r>
+              <a:rPr lang="en-GB" sz="2500" b="1" dirty="0" smtClean="0">
+                <a:solidFill>
+                  <a:srgbClr val="1E09B7"/>
+                </a:solidFill>
+              </a:rPr>
+              <a:t>models</a:t>
+            </a:r>
+            <a:r>
+              <a:rPr lang="en-GB" sz="2500" dirty="0" smtClean="0"/>
+              <a:t>,</a:t>
+            </a:r>
+            <a:r>
+              <a:rPr lang="en-GB" sz="2500" dirty="0" smtClean="0"/>
+              <a:t> </a:t>
+            </a:r>
+            <a:r>
+              <a:rPr lang="en-GB" sz="2500" b="1" dirty="0" smtClean="0"/>
+              <a:t>b</a:t>
+            </a:r>
+            <a:r>
+              <a:rPr lang="en-GB" sz="2500" b="1" dirty="0" smtClean="0"/>
+              <a:t>ound </a:t>
+            </a:r>
+            <a:r>
+              <a:rPr lang="en-GB" sz="2500" b="1" dirty="0" smtClean="0"/>
+              <a:t>to </a:t>
+            </a:r>
+            <a:r>
+              <a:rPr lang="en-GB" sz="2500" dirty="0" smtClean="0"/>
+              <a:t>appropriately populated </a:t>
+            </a:r>
+            <a:r>
+              <a:rPr lang="en-GB" sz="2500" b="1" dirty="0" smtClean="0">
+                <a:solidFill>
+                  <a:srgbClr val="009900"/>
+                </a:solidFill>
+              </a:rPr>
+              <a:t>frames</a:t>
+            </a:r>
+            <a:r>
+              <a:rPr lang="en-GB" sz="2500" b="1" dirty="0" smtClean="0">
+                <a:solidFill>
+                  <a:srgbClr val="FF0000"/>
+                </a:solidFill>
+              </a:rPr>
+              <a:t> </a:t>
+            </a:r>
+            <a:r>
+              <a:rPr lang="en-GB" sz="2500" b="1" dirty="0" smtClean="0">
+                <a:solidFill>
+                  <a:srgbClr val="009900"/>
+                </a:solidFill>
+              </a:rPr>
+              <a:t>models</a:t>
+            </a:r>
+          </a:p>
+          <a:p>
+            <a:pPr marL="285750" indent="-285750">
+              <a:spcBef>
+                <a:spcPct val="20000"/>
+              </a:spcBef>
+            </a:pPr>
+            <a:endParaRPr lang="en-GB" sz="800" b="1" dirty="0" smtClean="0">
+              <a:solidFill>
+                <a:srgbClr val="009900"/>
+              </a:solidFill>
+            </a:endParaRPr>
+          </a:p>
+          <a:p>
+            <a:pPr marL="285750" indent="-285750">
+              <a:spcBef>
+                <a:spcPct val="20000"/>
+              </a:spcBef>
+            </a:pPr>
+            <a:r>
+              <a:rPr lang="en-GB" sz="2500" dirty="0" smtClean="0"/>
+              <a:t>Instantiations </a:t>
+            </a:r>
+            <a:r>
+              <a:rPr lang="en-GB" sz="2500" dirty="0" smtClean="0"/>
+              <a:t>of </a:t>
+            </a:r>
+            <a:r>
+              <a:rPr lang="en-GB" sz="2500" b="1" dirty="0" smtClean="0">
+                <a:solidFill>
+                  <a:srgbClr val="1E09B7"/>
+                </a:solidFill>
+              </a:rPr>
+              <a:t>object models </a:t>
+            </a:r>
+            <a:r>
+              <a:rPr lang="en-GB" sz="2500" dirty="0" smtClean="0"/>
+              <a:t>operate </a:t>
+            </a:r>
+            <a:r>
+              <a:rPr lang="en-GB" sz="2500" b="1" dirty="0" smtClean="0"/>
+              <a:t>in-tandem </a:t>
+            </a:r>
+            <a:r>
+              <a:rPr lang="en-GB" sz="2500" dirty="0" smtClean="0"/>
+              <a:t>with instantiations </a:t>
+            </a:r>
+            <a:r>
+              <a:rPr lang="en-GB" sz="2500" dirty="0" smtClean="0"/>
+              <a:t>of bound </a:t>
+            </a:r>
+            <a:r>
+              <a:rPr lang="en-GB" sz="2500" b="1" dirty="0" smtClean="0">
+                <a:solidFill>
+                  <a:srgbClr val="009900"/>
+                </a:solidFill>
+              </a:rPr>
+              <a:t>frames</a:t>
+            </a:r>
+            <a:r>
+              <a:rPr lang="en-GB" sz="2500" b="1" dirty="0" smtClean="0">
+                <a:solidFill>
+                  <a:srgbClr val="FF0000"/>
+                </a:solidFill>
+              </a:rPr>
+              <a:t> </a:t>
+            </a:r>
+            <a:r>
+              <a:rPr lang="en-GB" sz="2500" b="1" dirty="0" smtClean="0">
+                <a:solidFill>
+                  <a:srgbClr val="009900"/>
+                </a:solidFill>
+              </a:rPr>
+              <a:t>models</a:t>
+            </a:r>
+            <a:endParaRPr lang="en-GB" sz="2500" b="1" dirty="0" smtClean="0">
               <a:solidFill>
                 <a:srgbClr val="FF0000"/>
               </a:solidFill>
-            </a:endParaRPr>
-          </a:p>
-          <a:p>
-            <a:pPr marL="342900" marR="0" lvl="0" indent="-342900" algn="l" defTabSz="914400" rtl="0" eaLnBrk="1" fontAlgn="auto" latinLnBrk="0" hangingPunct="1">
-              <a:lnSpc>
-                <a:spcPct val="100000"/>
-              </a:lnSpc>
-              <a:spcBef>
-                <a:spcPct val="20000"/>
-              </a:spcBef>
-              <a:spcAft>
-                <a:spcPts val="0"/>
-              </a:spcAft>
-              <a:buClrTx/>
-              <a:buSzTx/>
-              <a:buFont typeface="Arial" pitchFamily="34" charset="0"/>
-              <a:buNone/>
-              <a:tabLst/>
-              <a:defRPr/>
-            </a:pPr>
-            <a:endParaRPr kumimoji="0" lang="en-GB" sz="3200" b="0" i="0" u="none" strike="noStrike" kern="1200" cap="none" spc="0" normalizeH="0" baseline="0" noProof="0" dirty="0">
-              <a:ln>
-                <a:noFill/>
-              </a:ln>
-              <a:solidFill>
-                <a:schemeClr val="tx1"/>
-              </a:solidFill>
-              <a:effectLst/>
-              <a:uLnTx/>
-              <a:uFillTx/>
-              <a:latin typeface="+mn-lt"/>
-              <a:ea typeface="+mn-ea"/>
-              <a:cs typeface="+mn-cs"/>
             </a:endParaRPr>
           </a:p>
         </p:txBody>
@@ -4492,15 +3925,7 @@
           <a:p>
             <a:r>
               <a:rPr lang="en-GB" dirty="0" smtClean="0"/>
-              <a:t>A</a:t>
-            </a:r>
-            <a:r>
-              <a:rPr lang="en-GB" dirty="0" smtClean="0"/>
-              <a:t>lso </a:t>
-            </a:r>
-            <a:r>
-              <a:rPr lang="en-GB" dirty="0" smtClean="0"/>
-              <a:t>come with…</a:t>
+              <a:t>Also come with…</a:t>
             </a:r>
             <a:endParaRPr lang="en-GB" b="1" dirty="0">
               <a:solidFill>
@@ -4522,8 +3947,8 @@
         </p:nvSpPr>
         <p:spPr>
           <a:xfrm>
-            <a:off x="971600" y="1340768"/>
-            <a:ext cx="7200800" cy="2376264"/>
+            <a:off x="827584" y="1268760"/>
+            <a:ext cx="7416824" cy="2736304"/>
           </a:xfrm>
           <a:noFill/>
           <a:ln w="3175">
@@ -4555,7 +3980,7 @@
             </a:r>
             <a:r>
               <a:rPr lang="en-GB" sz="2500" dirty="0" smtClean="0"/>
-              <a:t>mechanism, via </a:t>
+              <a:t>mechanisms, delivered via </a:t>
             </a:r>
             <a:r>
               <a:rPr lang="en-GB" sz="2500" b="1" dirty="0" smtClean="0"/>
@@ -4582,10 +4007,14 @@
             </a:r>
           </a:p>
           <a:p>
-            <a:pPr>
-              <a:buFont typeface="Wingdings" pitchFamily="2" charset="2"/>
-              <a:buChar char="§"/>
+            <a:pPr marL="457200" indent="-457200">
+              <a:buFont typeface="+mj-lt"/>
+              <a:buAutoNum type="arabicPeriod"/>
             </a:pPr>
+            <a:r>
+              <a:rPr lang="en-GB" sz="2200" dirty="0" smtClean="0"/>
+              <a:t> </a:t>
+            </a:r>
             <a:r>
               <a:rPr lang="en-GB" sz="2200" b="1" dirty="0" smtClean="0">
                 <a:solidFill>
@@ -4628,11 +4057,15 @@
             </a:r>
           </a:p>
           <a:p>
-            <a:pPr>
-              <a:buFont typeface="Wingdings" pitchFamily="2" charset="2"/>
-              <a:buChar char="§"/>
+            <a:pPr marL="457200" indent="-457200">
+              <a:buFont typeface="+mj-lt"/>
+              <a:buAutoNum type="arabicPeriod"/>
             </a:pPr>
             <a:r>
+              <a:rPr lang="en-GB" sz="2200" dirty="0" smtClean="0"/>
+              <a:t> </a:t>
+            </a:r>
+            <a:r>
               <a:rPr lang="en-GB" sz="2200" b="1" dirty="0" smtClean="0">
                 <a:solidFill>
                   <a:srgbClr val="FF0000"/>
@@ -4642,7 +4075,11 @@
             </a:r>
             <a:r>
               <a:rPr lang="en-GB" sz="2200" dirty="0" smtClean="0"/>
-              <a:t> (</a:t>
+              <a:t> </a:t>
+            </a:r>
+            <a:r>
+              <a:rPr lang="en-GB" sz="2200" dirty="0" smtClean="0"/>
+              <a:t>(</a:t>
             </a:r>
             <a:r>
               <a:rPr lang="en-GB" sz="2200" dirty="0" err="1"/>
@@ -4674,13 +4111,13 @@
             </a:r>
           </a:p>
           <a:p>
-            <a:pPr>
-              <a:buFont typeface="Wingdings" pitchFamily="2" charset="2"/>
-              <a:buChar char="§"/>
+            <a:pPr marL="457200" indent="-457200">
+              <a:buFont typeface="+mj-lt"/>
+              <a:buAutoNum type="arabicPeriod"/>
             </a:pPr>
             <a:r>
               <a:rPr lang="en-GB" sz="2200" dirty="0" smtClean="0"/>
-              <a:t>The </a:t>
+              <a:t> The </a:t>
             </a:r>
             <a:r>
               <a:rPr lang="en-GB" sz="2200" b="1" dirty="0">
@@ -4724,8 +4161,8 @@
         </p:nvSpPr>
         <p:spPr>
           <a:xfrm>
-            <a:off x="971600" y="4365104"/>
-            <a:ext cx="7200800" cy="1944216"/>
+            <a:off x="827584" y="4365104"/>
+            <a:ext cx="7416824" cy="2016224"/>
           </a:xfrm>
           <a:prstGeom prst="rect">
             <a:avLst/>
@@ -4828,7 +4265,65 @@
             </a:r>
           </a:p>
           <a:p>
-            <a:pPr marL="285750" indent="-285750">
+            <a:pPr marL="514350" indent="-514350">
+              <a:spcBef>
+                <a:spcPct val="20000"/>
+              </a:spcBef>
+              <a:buFont typeface="+mj-lt"/>
+              <a:buAutoNum type="arabicPeriod"/>
+            </a:pPr>
+            <a:r>
+              <a:rPr lang="en-GB" sz="2600" b="1" dirty="0" smtClean="0"/>
+              <a:t>Browse </a:t>
+            </a:r>
+            <a:r>
+              <a:rPr lang="en-GB" sz="2600" b="1" dirty="0" smtClean="0">
+                <a:solidFill>
+                  <a:srgbClr val="009900"/>
+                </a:solidFill>
+              </a:rPr>
+              <a:t>frames</a:t>
+            </a:r>
+            <a:r>
+              <a:rPr lang="en-GB" sz="2600" b="1" dirty="0" smtClean="0">
+                <a:solidFill>
+                  <a:srgbClr val="FF0000"/>
+                </a:solidFill>
+              </a:rPr>
+              <a:t> </a:t>
+            </a:r>
+            <a:r>
+              <a:rPr lang="en-GB" sz="2600" b="1" dirty="0" smtClean="0">
+                <a:solidFill>
+                  <a:srgbClr val="009900"/>
+                </a:solidFill>
+              </a:rPr>
+              <a:t>model</a:t>
+            </a:r>
+          </a:p>
+          <a:p>
+            <a:pPr marL="514350" indent="-514350">
+              <a:spcBef>
+                <a:spcPct val="20000"/>
+              </a:spcBef>
+              <a:buFont typeface="+mj-lt"/>
+              <a:buAutoNum type="arabicPeriod"/>
+            </a:pPr>
+            <a:r>
+              <a:rPr lang="en-GB" sz="2600" dirty="0" smtClean="0"/>
+              <a:t>Explore </a:t>
+            </a:r>
+            <a:r>
+              <a:rPr lang="en-GB" sz="2600" b="1" dirty="0" smtClean="0"/>
+              <a:t>dynamic behaviour </a:t>
+            </a:r>
+            <a:r>
+              <a:rPr lang="en-GB" sz="2600" dirty="0" smtClean="0"/>
+              <a:t>of specific instantiations</a:t>
+            </a:r>
+          </a:p>
+          <a:p>
+            <a:pPr marL="971550" lvl="1" indent="-514350">
               <a:spcBef>
                 <a:spcPct val="20000"/>
               </a:spcBef>
@@ -4836,16 +4331,24 @@
               <a:buChar char="§"/>
             </a:pPr>
             <a:r>
-              <a:rPr lang="en-GB" sz="2600" b="1" dirty="0" smtClean="0"/>
-              <a:t>Browse </a:t>
+              <a:rPr lang="en-GB" sz="2600" dirty="0" smtClean="0"/>
+              <a:t>As provided via </a:t>
             </a:r>
             <a:r>
               <a:rPr lang="en-GB" sz="2600" b="1" dirty="0" smtClean="0">
                 <a:solidFill>
-                  <a:srgbClr val="009900"/>
-                </a:solidFill>
-              </a:rPr>
-              <a:t>frames</a:t>
+                  <a:srgbClr val="FF0000"/>
+                </a:solidFill>
+              </a:rPr>
+              <a:t>external </a:t>
+            </a:r>
+            <a:r>
+              <a:rPr lang="en-GB" sz="2600" b="1" dirty="0" err="1" smtClean="0">
+                <a:solidFill>
+                  <a:srgbClr val="FF0000"/>
+                </a:solidFill>
+              </a:rPr>
+              <a:t>reasoners</a:t>
             </a:r>
             <a:r>
               <a:rPr lang="en-GB" sz="2600" b="1" dirty="0" smtClean="0">
@@ -4856,92 +4359,26 @@
               <a:t> </a:t>
             </a:r>
             <a:r>
+              <a:rPr lang="en-GB" sz="2600" dirty="0" smtClean="0"/>
+              <a:t>or </a:t>
+            </a:r>
+            <a:r>
               <a:rPr lang="en-GB" sz="2600" b="1" dirty="0" smtClean="0">
                 <a:solidFill>
-                  <a:srgbClr val="009900"/>
-                </a:solidFill>
-              </a:rPr>
-              <a:t>model</a:t>
-            </a:r>
-          </a:p>
-          <a:p>
-            <a:pPr marL="285750" indent="-285750">
+                  <a:srgbClr val="1E09B7"/>
+                </a:solidFill>
+              </a:rPr>
+              <a:t>object model</a:t>
+            </a:r>
+            <a:endParaRPr lang="en-GB" sz="2600" dirty="0" smtClean="0"/>
+          </a:p>
+          <a:p>
+            <a:pPr marL="514350" indent="-514350">
               <a:spcBef>
                 <a:spcPct val="20000"/>
               </a:spcBef>
-              <a:buFont typeface="Wingdings" pitchFamily="2" charset="2"/>
-              <a:buChar char="§"/>
-            </a:pPr>
-            <a:r>
-              <a:rPr lang="en-GB" sz="2600" dirty="0" smtClean="0"/>
-              <a:t>Explore </a:t>
-            </a:r>
-            <a:r>
-              <a:rPr lang="en-GB" sz="2600" b="1" dirty="0" smtClean="0"/>
-              <a:t>dynamic behaviour </a:t>
-            </a:r>
-            <a:r>
-              <a:rPr lang="en-GB" sz="2600" dirty="0" smtClean="0"/>
-              <a:t>of specific instantiations</a:t>
-            </a:r>
-          </a:p>
-          <a:p>
-            <a:pPr marL="742950" lvl="1" indent="-285750">
-              <a:spcBef>
-                <a:spcPct val="20000"/>
-              </a:spcBef>
-              <a:buFont typeface="Wingdings" pitchFamily="2" charset="2"/>
-              <a:buChar char="§"/>
-            </a:pPr>
-            <a:r>
-              <a:rPr lang="en-GB" sz="2600" dirty="0" smtClean="0"/>
-              <a:t>As provided via </a:t>
-            </a:r>
-            <a:r>
-              <a:rPr lang="en-GB" sz="2600" b="1" dirty="0" smtClean="0">
-                <a:solidFill>
-                  <a:srgbClr val="FF0000"/>
-                </a:solidFill>
-              </a:rPr>
-              <a:t>external </a:t>
-            </a:r>
-            <a:r>
-              <a:rPr lang="en-GB" sz="2600" b="1" dirty="0" err="1" smtClean="0">
-                <a:solidFill>
-                  <a:srgbClr val="FF0000"/>
-                </a:solidFill>
-              </a:rPr>
-              <a:t>reasoners</a:t>
-            </a:r>
-            <a:r>
-              <a:rPr lang="en-GB" sz="2600" b="1" dirty="0" smtClean="0">
-                <a:solidFill>
-                  <a:srgbClr val="FF0000"/>
-                </a:solidFill>
-              </a:rPr>
-              <a:t> </a:t>
-            </a:r>
-            <a:r>
-              <a:rPr lang="en-GB" sz="2600" dirty="0" smtClean="0"/>
-              <a:t>or </a:t>
-            </a:r>
-            <a:r>
-              <a:rPr lang="en-GB" sz="2600" b="1" dirty="0" smtClean="0">
-                <a:solidFill>
-                  <a:srgbClr val="1E09B7"/>
-                </a:solidFill>
-              </a:rPr>
-              <a:t>object model</a:t>
-            </a:r>
-            <a:endParaRPr lang="en-GB" sz="2600" dirty="0" smtClean="0"/>
-          </a:p>
-          <a:p>
-            <a:pPr marL="285750" indent="-285750">
-              <a:spcBef>
-                <a:spcPct val="20000"/>
-              </a:spcBef>
-              <a:buFont typeface="Wingdings" pitchFamily="2" charset="2"/>
-              <a:buChar char="§"/>
+              <a:buFont typeface="+mj-lt"/>
+              <a:buAutoNum type="arabicPeriod"/>
             </a:pPr>
             <a:r>
               <a:rPr lang="en-GB" sz="2600" b="1" dirty="0" smtClean="0"/>
@@ -5077,7 +4514,7 @@
         </p:spPr>
         <p:txBody>
           <a:bodyPr>
-            <a:normAutofit fontScale="92500" lnSpcReduction="20000"/>
+            <a:normAutofit fontScale="85000" lnSpcReduction="10000"/>
           </a:bodyPr>
           <a:lstStyle/>
           <a:p>
@@ -5097,7 +4534,7 @@
               <a:t> </a:t>
             </a:r>
             <a:r>
-              <a:rPr lang="en-GB" sz="3100" dirty="0" smtClean="0"/>
+              <a:rPr lang="en-GB" sz="2800" dirty="0" smtClean="0"/>
               <a:t>&amp; </a:t>
             </a:r>
             <a:r>
@@ -5112,45 +4549,62 @@
               <a:rPr lang="en-GB" sz="2800" dirty="0"/>
               <a:t> </a:t>
             </a:r>
-            <a:endParaRPr lang="en-GB" sz="3100" dirty="0" smtClean="0"/>
-          </a:p>
-          <a:p>
-            <a:pPr>
+            <a:endParaRPr lang="en-GB" sz="2800" dirty="0" smtClean="0"/>
+          </a:p>
+          <a:p>
+            <a:pPr marL="514350" indent="-514350">
+              <a:buFont typeface="+mj-lt"/>
+              <a:buAutoNum type="arabicPeriod"/>
+            </a:pPr>
+            <a:r>
+              <a:rPr lang="en-GB" sz="2700" dirty="0" smtClean="0"/>
+              <a:t>Provide </a:t>
+            </a:r>
+            <a:r>
+              <a:rPr lang="en-GB" sz="2700" b="1" dirty="0" smtClean="0"/>
+              <a:t>layered </a:t>
+            </a:r>
+            <a:r>
+              <a:rPr lang="en-GB" sz="2700" b="1" dirty="0" smtClean="0"/>
+              <a:t>architecture</a:t>
+            </a:r>
+            <a:r>
+              <a:rPr lang="en-GB" sz="2700" dirty="0" smtClean="0"/>
+              <a:t>:</a:t>
+            </a:r>
+          </a:p>
+          <a:p>
+            <a:pPr marL="914400" lvl="1" indent="-514350">
               <a:buFont typeface="Wingdings" pitchFamily="2" charset="2"/>
               <a:buChar char="§"/>
             </a:pPr>
             <a:r>
-              <a:rPr lang="en-GB" sz="2800" dirty="0" smtClean="0"/>
-              <a:t>Provide </a:t>
-            </a:r>
-            <a:r>
-              <a:rPr lang="en-GB" sz="2800" b="1" dirty="0" smtClean="0"/>
-              <a:t>appropriate layered architecture</a:t>
-            </a:r>
-            <a:r>
-              <a:rPr lang="en-GB" sz="2800" dirty="0" smtClean="0"/>
-              <a:t>:</a:t>
-            </a:r>
-          </a:p>
-          <a:p>
-            <a:pPr marL="685800" lvl="1">
-              <a:buFont typeface="Wingdings" pitchFamily="2" charset="2"/>
-              <a:buChar char="§"/>
-            </a:pPr>
-            <a:r>
               <a:rPr lang="en-GB" sz="2600" dirty="0" smtClean="0"/>
-              <a:t>Structured means of combining:</a:t>
-            </a:r>
-          </a:p>
-          <a:p>
-            <a:pPr marL="1085850" lvl="2">
+              <a:t>Structured means of </a:t>
+            </a:r>
+            <a:r>
+              <a:rPr lang="en-GB" sz="2600" dirty="0" smtClean="0"/>
+              <a:t>combining:</a:t>
+            </a:r>
+            <a:endParaRPr lang="en-GB" sz="2600" dirty="0" smtClean="0"/>
+          </a:p>
+          <a:p>
+            <a:pPr marL="1314450" lvl="2" indent="-457200">
               <a:buFont typeface="Wingdings" pitchFamily="2" charset="2"/>
               <a:buChar char="§"/>
               <a:defRPr/>
             </a:pPr>
             <a:r>
               <a:rPr lang="en-GB" dirty="0" smtClean="0"/>
-              <a:t>Diverse </a:t>
+              <a:t> </a:t>
+            </a:r>
+            <a:r>
+              <a:rPr lang="en-GB" b="1" dirty="0" smtClean="0">
+                <a:solidFill>
+                  <a:srgbClr val="FF0000"/>
+                </a:solidFill>
+              </a:rPr>
+              <a:t>Generic </a:t>
             </a:r>
             <a:r>
               <a:rPr lang="en-GB" b="1" dirty="0" smtClean="0">
@@ -5179,22 +4633,22 @@
             </a:endParaRPr>
           </a:p>
           <a:p>
-            <a:pPr marL="1085850" lvl="2">
+            <a:pPr marL="1314450" lvl="2" indent="-457200">
               <a:buFont typeface="Wingdings" pitchFamily="2" charset="2"/>
               <a:buChar char="§"/>
               <a:defRPr/>
             </a:pPr>
             <a:r>
+              <a:rPr lang="en-GB" dirty="0" smtClean="0"/>
+              <a:t> </a:t>
+            </a:r>
+            <a:r>
               <a:rPr lang="en-GB" b="1" dirty="0" smtClean="0">
                 <a:solidFill>
-                  <a:srgbClr val="FF0000"/>
-                </a:solidFill>
-              </a:rPr>
-              <a:t>Generic reasoning </a:t>
-            </a:r>
-            <a:r>
-              <a:rPr lang="en-GB" dirty="0" smtClean="0"/>
-              <a:t>+ </a:t>
+                  <a:srgbClr val="1E09B7"/>
+                </a:solidFill>
+              </a:rPr>
+              <a:t>Dom</a:t>
             </a:r>
             <a:r>
               <a:rPr lang="en-GB" b="1" dirty="0" smtClean="0">
@@ -5202,11 +4656,19 @@
                   <a:srgbClr val="1E09B7"/>
                 </a:solidFill>
               </a:rPr>
-              <a:t>domain-specific processing</a:t>
-            </a:r>
-          </a:p>
-          <a:p>
-            <a:pPr lvl="1">
+              <a:t>ain-specific </a:t>
+            </a:r>
+            <a:r>
+              <a:rPr lang="en-GB" b="1" dirty="0" smtClean="0">
+                <a:solidFill>
+                  <a:srgbClr val="1E09B7"/>
+                </a:solidFill>
+              </a:rPr>
+              <a:t>processing</a:t>
+            </a:r>
+          </a:p>
+          <a:p>
+            <a:pPr marL="971550" lvl="1" indent="-514350">
               <a:buFont typeface="Wingdings" pitchFamily="2" charset="2"/>
               <a:buChar char="§"/>
             </a:pPr>
@@ -5216,29 +4678,30 @@
             </a:r>
           </a:p>
           <a:p>
-            <a:pPr>
+            <a:pPr marL="514350" indent="-514350">
+              <a:buFont typeface="+mj-lt"/>
+              <a:buAutoNum type="arabicPeriod"/>
+            </a:pPr>
+            <a:r>
+              <a:rPr lang="en-GB" sz="2700" dirty="0" smtClean="0"/>
+              <a:t>Handle much of the </a:t>
+            </a:r>
+            <a:r>
+              <a:rPr lang="en-GB" sz="2700" b="1" dirty="0" smtClean="0"/>
+              <a:t>dirty work</a:t>
+            </a:r>
+            <a:r>
+              <a:rPr lang="en-GB" sz="2700" dirty="0" smtClean="0"/>
+              <a:t>:</a:t>
+            </a:r>
+            <a:endParaRPr lang="en-GB" sz="2700" dirty="0" smtClean="0"/>
+          </a:p>
+          <a:p>
+            <a:pPr marL="971550" lvl="1" indent="-514350">
               <a:buFont typeface="Wingdings" pitchFamily="2" charset="2"/>
               <a:buChar char="§"/>
             </a:pPr>
             <a:r>
-              <a:rPr lang="en-GB" sz="2800" dirty="0" smtClean="0"/>
-              <a:t>Handle much of the </a:t>
-            </a:r>
-            <a:r>
-              <a:rPr lang="en-GB" sz="2800" b="1" dirty="0" smtClean="0"/>
-              <a:t>dirty work</a:t>
-            </a:r>
-            <a:r>
-              <a:rPr lang="en-GB" sz="2800" dirty="0" smtClean="0"/>
-              <a:t>:</a:t>
-            </a:r>
-          </a:p>
-          <a:p>
-            <a:pPr lvl="1">
-              <a:buFont typeface="Wingdings" pitchFamily="2" charset="2"/>
-              <a:buChar char="§"/>
-            </a:pPr>
-            <a:r>
               <a:rPr lang="en-GB" sz="2600" dirty="0" smtClean="0"/>
               <a:t>Lower-level interaction with </a:t>
             </a:r>
@@ -5252,7 +4715,7 @@
             </a:r>
             <a:r>
               <a:rPr lang="en-GB" sz="2600" dirty="0" smtClean="0"/>
-              <a:t>/</a:t>
+              <a:t> + </a:t>
             </a:r>
             <a:r>
               <a:rPr lang="en-GB" sz="2600" b="1" dirty="0" err="1" smtClean="0">
@@ -5269,7 +4732,7 @@
             </a:endParaRPr>
           </a:p>
           <a:p>
-            <a:pPr lvl="1">
+            <a:pPr marL="971550" lvl="1" indent="-514350">
               <a:buFont typeface="Wingdings" pitchFamily="2" charset="2"/>
               <a:buChar char="§"/>
             </a:pPr>
@@ -5279,29 +4742,29 @@
             </a:r>
           </a:p>
           <a:p>
-            <a:pPr>
+            <a:pPr marL="514350" indent="-514350">
+              <a:buFont typeface="+mj-lt"/>
+              <a:buAutoNum type="arabicPeriod"/>
+            </a:pPr>
+            <a:r>
+              <a:rPr lang="en-GB" sz="2700" dirty="0" smtClean="0"/>
+              <a:t>Provide client access via </a:t>
+            </a:r>
+            <a:r>
+              <a:rPr lang="en-GB" sz="2700" b="1" dirty="0" smtClean="0"/>
+              <a:t>appropriate APIs</a:t>
+            </a:r>
+            <a:r>
+              <a:rPr lang="en-GB" sz="2700" dirty="0" smtClean="0"/>
+              <a:t>:</a:t>
+            </a:r>
+          </a:p>
+          <a:p>
+            <a:pPr marL="971550" lvl="1" indent="-514350">
               <a:buFont typeface="Wingdings" pitchFamily="2" charset="2"/>
               <a:buChar char="§"/>
             </a:pPr>
             <a:r>
-              <a:rPr lang="en-GB" sz="2800" dirty="0" smtClean="0"/>
-              <a:t>Provide client access via </a:t>
-            </a:r>
-            <a:r>
-              <a:rPr lang="en-GB" sz="2800" b="1" dirty="0" smtClean="0"/>
-              <a:t>appropriate APIs</a:t>
-            </a:r>
-            <a:r>
-              <a:rPr lang="en-GB" sz="2800" dirty="0" smtClean="0"/>
-              <a:t>:</a:t>
-            </a:r>
-          </a:p>
-          <a:p>
-            <a:pPr lvl="1">
-              <a:buFont typeface="Wingdings" pitchFamily="2" charset="2"/>
-              <a:buChar char="§"/>
-            </a:pPr>
-            <a:r>
               <a:rPr lang="en-GB" sz="2600" dirty="0" smtClean="0"/>
               <a:t>Generic </a:t>
             </a:r>
@@ -5331,7 +4794,7 @@
             </a:r>
           </a:p>
           <a:p>
-            <a:pPr lvl="1">
+            <a:pPr marL="971550" lvl="1" indent="-514350">
               <a:buFont typeface="Wingdings" pitchFamily="2" charset="2"/>
               <a:buChar char="§"/>
             </a:pPr>
@@ -5400,7 +4863,7 @@
         </p:nvSpPr>
         <p:spPr>
           <a:xfrm>
-            <a:off x="1403648" y="1484784"/>
+            <a:off x="1331640" y="1484784"/>
             <a:ext cx="6480720" cy="1296144"/>
           </a:xfrm>
           <a:solidFill>
@@ -5489,7 +4952,7 @@
         </p:nvSpPr>
         <p:spPr>
           <a:xfrm>
-            <a:off x="1907704" y="3284984"/>
+            <a:off x="1835696" y="3284984"/>
             <a:ext cx="5472608" cy="3024336"/>
           </a:xfrm>
           <a:prstGeom prst="rect">
@@ -5904,7 +5367,12 @@
             <p:ph type="title"/>
           </p:nvPr>
         </p:nvSpPr>
-        <p:spPr/>
+        <p:spPr>
+          <a:xfrm>
+            <a:off x="467544" y="188640"/>
+            <a:ext cx="8229600" cy="1143000"/>
+          </a:xfrm>
+        </p:spPr>
         <p:txBody>
           <a:bodyPr/>
           <a:lstStyle/>
@@ -5955,1711 +5423,78 @@
       </p:grpSpPr>
       <p:sp>
         <p:nvSpPr>
-          <p:cNvPr id="2" name="Title 1"/>
-          <p:cNvSpPr>
-            <a:spLocks noGrp="1"/>
-          </p:cNvSpPr>
-          <p:nvPr>
-            <p:ph type="title"/>
+          <p:cNvPr id="3" name="Content Placeholder 2"/>
+          <p:cNvSpPr>
+            <a:spLocks noGrp="1"/>
+          </p:cNvSpPr>
+          <p:nvPr>
+            <p:ph idx="1"/>
           </p:nvPr>
         </p:nvSpPr>
         <p:spPr>
           <a:xfrm>
-            <a:off x="467544" y="188640"/>
-            <a:ext cx="8229600" cy="1008112"/>
-          </a:xfrm>
-        </p:spPr>
-        <p:txBody>
-          <a:bodyPr/>
-          <a:lstStyle/>
-          <a:p>
-            <a:r>
-              <a:rPr lang="en-GB" b="1" dirty="0" smtClean="0">
-                <a:solidFill>
-                  <a:srgbClr val="009900"/>
-                </a:solidFill>
-              </a:rPr>
-              <a:t>MEKON</a:t>
-            </a:r>
-            <a:r>
-              <a:rPr lang="en-GB" b="1" dirty="0" smtClean="0"/>
-              <a:t> </a:t>
-            </a:r>
-            <a:r>
-              <a:rPr lang="en-GB" dirty="0" smtClean="0"/>
-              <a:t>+</a:t>
-            </a:r>
-            <a:r>
-              <a:rPr lang="en-GB" b="1" dirty="0" smtClean="0"/>
-              <a:t> </a:t>
-            </a:r>
-            <a:r>
-              <a:rPr lang="en-GB" b="1" dirty="0" smtClean="0">
-                <a:solidFill>
-                  <a:srgbClr val="1E09B7"/>
-                </a:solidFill>
-              </a:rPr>
-              <a:t>HOBO</a:t>
-            </a:r>
-            <a:endParaRPr lang="en-GB" b="1" dirty="0">
-              <a:solidFill>
-                <a:srgbClr val="1E09B7"/>
-              </a:solidFill>
-            </a:endParaRPr>
-          </a:p>
-        </p:txBody>
-      </p:sp>
-      <p:sp>
-        <p:nvSpPr>
-          <p:cNvPr id="3" name="Content Placeholder 2"/>
-          <p:cNvSpPr>
-            <a:spLocks noGrp="1"/>
-          </p:cNvSpPr>
-          <p:nvPr>
-            <p:ph idx="1"/>
-          </p:nvPr>
-        </p:nvSpPr>
-        <p:spPr>
-          <a:xfrm>
-            <a:off x="1187624" y="1340768"/>
-            <a:ext cx="6768752" cy="1584176"/>
+            <a:off x="1259632" y="1628800"/>
+            <a:ext cx="6768752" cy="3384376"/>
           </a:xfrm>
           <a:solidFill>
-            <a:schemeClr val="accent3">
-              <a:lumMod val="40000"/>
-              <a:lumOff val="60000"/>
-            </a:schemeClr>
+            <a:schemeClr val="bg1"/>
           </a:solidFill>
-          <a:ln w="28575">
-            <a:solidFill>
-              <a:schemeClr val="tx1"/>
-            </a:solidFill>
+          <a:ln w="3175">
+            <a:noFill/>
           </a:ln>
         </p:spPr>
         <p:txBody>
           <a:bodyPr>
-            <a:normAutofit fontScale="92500" lnSpcReduction="20000"/>
-          </a:bodyPr>
-          <a:lstStyle/>
-          <a:p>
-            <a:pPr algn="ctr">
-              <a:buNone/>
-            </a:pPr>
-            <a:r>
-              <a:rPr lang="en-GB" sz="3600" b="1" dirty="0" smtClean="0"/>
-              <a:t>Java Frameworks</a:t>
-            </a:r>
-          </a:p>
-          <a:p>
-            <a:pPr algn="ctr">
-              <a:buNone/>
-            </a:pPr>
-            <a:r>
-              <a:rPr lang="en-GB" sz="3600" dirty="0" smtClean="0"/>
-              <a:t>for building</a:t>
-            </a:r>
-          </a:p>
-          <a:p>
-            <a:pPr algn="ctr">
-              <a:buNone/>
-            </a:pPr>
-            <a:r>
-              <a:rPr lang="en-GB" sz="3600" b="1" dirty="0" smtClean="0"/>
-              <a:t>Ontology-Driven Applications</a:t>
-            </a:r>
-          </a:p>
-          <a:p>
-            <a:pPr>
-              <a:buNone/>
-            </a:pPr>
-            <a:endParaRPr lang="en-GB" sz="1300" dirty="0" smtClean="0"/>
-          </a:p>
-        </p:txBody>
-      </p:sp>
-      <p:sp>
-        <p:nvSpPr>
-          <p:cNvPr id="5" name="Content Placeholder 2"/>
-          <p:cNvSpPr txBox="1">
-            <a:spLocks/>
-          </p:cNvSpPr>
-          <p:nvPr/>
-        </p:nvSpPr>
-        <p:spPr>
-          <a:xfrm>
-            <a:off x="1187624" y="3284984"/>
-            <a:ext cx="6768752" cy="3096344"/>
-          </a:xfrm>
-          <a:prstGeom prst="rect">
-            <a:avLst/>
-          </a:prstGeom>
-          <a:solidFill>
-            <a:schemeClr val="accent3">
-              <a:lumMod val="40000"/>
-              <a:lumOff val="60000"/>
-            </a:schemeClr>
-          </a:solidFill>
-          <a:ln w="28575">
-            <a:solidFill>
-              <a:schemeClr val="tx1"/>
-            </a:solidFill>
-          </a:ln>
-        </p:spPr>
-        <p:txBody>
-          <a:bodyPr vert="horz" lIns="91440" tIns="45720" rIns="91440" bIns="45720" rtlCol="0">
             <a:normAutofit/>
           </a:bodyPr>
           <a:lstStyle/>
           <a:p>
-            <a:r>
-              <a:rPr lang="en-GB" sz="2600" dirty="0" smtClean="0"/>
-              <a:t>Current use cases:</a:t>
-            </a:r>
-          </a:p>
-          <a:p>
-            <a:pPr marL="285750" indent="-285750">
-              <a:spcBef>
-                <a:spcPct val="20000"/>
-              </a:spcBef>
-              <a:buFont typeface="Wingdings" pitchFamily="2" charset="2"/>
-              <a:buChar char="§"/>
+            <a:pPr>
+              <a:buNone/>
             </a:pPr>
             <a:r>
-              <a:rPr lang="en-GB" sz="2400" i="1" dirty="0" smtClean="0"/>
-              <a:t>Almost(!)</a:t>
-            </a:r>
-            <a:r>
-              <a:rPr lang="en-GB" sz="2400" dirty="0" smtClean="0"/>
-              <a:t> products:</a:t>
-            </a:r>
-          </a:p>
-          <a:p>
-            <a:pPr marL="742950" lvl="1" indent="-285750">
-              <a:spcBef>
-                <a:spcPct val="20000"/>
-              </a:spcBef>
-              <a:buFont typeface="Wingdings" pitchFamily="2" charset="2"/>
-              <a:buChar char="§"/>
+              <a:rPr lang="en-GB" sz="6600" dirty="0" smtClean="0"/>
+              <a:t>Come and see </a:t>
+            </a:r>
+            <a:r>
+              <a:rPr lang="en-GB" sz="6600" b="1" dirty="0" smtClean="0">
+                <a:solidFill>
+                  <a:srgbClr val="009900"/>
+                </a:solidFill>
+              </a:rPr>
+              <a:t>MEKON</a:t>
+            </a:r>
+            <a:r>
+              <a:rPr lang="en-GB" sz="6600" b="1" dirty="0" smtClean="0"/>
+              <a:t> </a:t>
+            </a:r>
+            <a:r>
+              <a:rPr lang="en-GB" sz="6600" dirty="0" smtClean="0"/>
+              <a:t>&amp;</a:t>
+            </a:r>
+            <a:r>
+              <a:rPr lang="en-GB" sz="6600" b="1" dirty="0" smtClean="0"/>
+              <a:t> </a:t>
+            </a:r>
+            <a:r>
+              <a:rPr lang="en-GB" sz="6600" b="1" dirty="0" smtClean="0">
+                <a:solidFill>
+                  <a:srgbClr val="1E09B7"/>
+                </a:solidFill>
+              </a:rPr>
+              <a:t>HOBO </a:t>
+            </a:r>
+            <a:r>
+              <a:rPr lang="en-GB" sz="6600" dirty="0" smtClean="0"/>
+              <a:t>demo</a:t>
+            </a:r>
+            <a:endParaRPr lang="en-GB" sz="6600" dirty="0" smtClean="0"/>
+          </a:p>
+          <a:p>
+            <a:pPr>
+              <a:buNone/>
             </a:pPr>
-            <a:r>
-              <a:rPr lang="en-GB" sz="2200" dirty="0" smtClean="0"/>
-              <a:t>Knowledge-driven </a:t>
-            </a:r>
-            <a:r>
-              <a:rPr lang="en-GB" sz="2200" b="1" dirty="0" smtClean="0"/>
-              <a:t>clinical documentation </a:t>
-            </a:r>
-            <a:r>
-              <a:rPr lang="en-GB" sz="2200" dirty="0" smtClean="0"/>
-              <a:t>system</a:t>
-            </a:r>
-          </a:p>
-          <a:p>
-            <a:pPr marL="742950" lvl="1" indent="-285750">
-              <a:spcBef>
-                <a:spcPct val="20000"/>
-              </a:spcBef>
-              <a:buFont typeface="Wingdings" pitchFamily="2" charset="2"/>
-              <a:buChar char="§"/>
-            </a:pPr>
-            <a:r>
-              <a:rPr lang="en-GB" sz="2200" dirty="0" smtClean="0"/>
-              <a:t>Web-based </a:t>
-            </a:r>
-            <a:r>
-              <a:rPr lang="en-GB" sz="2200" b="1" dirty="0" smtClean="0"/>
-              <a:t>recruitment </a:t>
-            </a:r>
-            <a:r>
-              <a:rPr lang="en-GB" sz="2200" dirty="0" smtClean="0"/>
-              <a:t>application </a:t>
-            </a:r>
-          </a:p>
-          <a:p>
-            <a:pPr marL="285750" indent="-285750">
-              <a:spcBef>
-                <a:spcPct val="20000"/>
-              </a:spcBef>
-              <a:buFont typeface="Wingdings" pitchFamily="2" charset="2"/>
-              <a:buChar char="§"/>
-            </a:pPr>
-            <a:r>
-              <a:rPr lang="en-GB" sz="2400" dirty="0" smtClean="0"/>
-              <a:t>Early prototypes:</a:t>
-            </a:r>
-          </a:p>
-          <a:p>
-            <a:pPr marL="742950" lvl="1" indent="-285750">
-              <a:spcBef>
-                <a:spcPct val="20000"/>
-              </a:spcBef>
-              <a:buFont typeface="Wingdings" pitchFamily="2" charset="2"/>
-              <a:buChar char="§"/>
-            </a:pPr>
-            <a:r>
-              <a:rPr lang="en-GB" sz="2200" b="1" dirty="0" smtClean="0"/>
-              <a:t>Sepsis prediction </a:t>
-            </a:r>
-            <a:r>
-              <a:rPr lang="en-GB" sz="2200" dirty="0" smtClean="0"/>
-              <a:t>system</a:t>
-            </a:r>
-          </a:p>
-          <a:p>
-            <a:pPr marL="742950" lvl="1" indent="-285750">
-              <a:spcBef>
-                <a:spcPct val="20000"/>
-              </a:spcBef>
-              <a:buFont typeface="Wingdings" pitchFamily="2" charset="2"/>
-              <a:buChar char="§"/>
-            </a:pPr>
-            <a:r>
-              <a:rPr lang="en-GB" sz="2200" b="1" dirty="0" smtClean="0"/>
-              <a:t>Clinical trials </a:t>
-            </a:r>
-            <a:r>
-              <a:rPr lang="en-GB" sz="2200" dirty="0" smtClean="0"/>
-              <a:t>design/design-retrieval system</a:t>
-            </a:r>
-          </a:p>
-        </p:txBody>
-      </p:sp>
-    </p:spTree>
-  </p:cSld>
-  <p:clrMapOvr>
-    <a:masterClrMapping/>
-  </p:clrMapOvr>
-  <p:timing>
-    <p:tnLst>
-      <p:par>
-        <p:cTn id="1" dur="indefinite" restart="never" nodeType="tmRoot"/>
-      </p:par>
-    </p:tnLst>
-  </p:timing>
-</p:sld>
-</file>
-
-<file path=ppt/slides/slide7.xml><?xml version="1.0" encoding="utf-8"?>
-<p:sld xmlns:a="http://schemas.openxmlformats.org/drawingml/2006/main" xmlns:r="http://schemas.openxmlformats.org/officeDocument/2006/relationships" xmlns:p="http://schemas.openxmlformats.org/presentationml/2006/main">
-  <p:cSld>
-    <p:spTree>
-      <p:nvGrpSpPr>
-        <p:cNvPr id="1" name=""/>
-        <p:cNvGrpSpPr/>
-        <p:nvPr/>
-      </p:nvGrpSpPr>
-      <p:grpSpPr>
-        <a:xfrm>
-          <a:off x="0" y="0"/>
-          <a:ext cx="0" cy="0"/>
-          <a:chOff x="0" y="0"/>
-          <a:chExt cx="0" cy="0"/>
-        </a:xfrm>
-      </p:grpSpPr>
-      <p:sp>
-        <p:nvSpPr>
-          <p:cNvPr id="2" name="Title 1"/>
-          <p:cNvSpPr>
-            <a:spLocks noGrp="1"/>
-          </p:cNvSpPr>
-          <p:nvPr>
-            <p:ph type="title"/>
-          </p:nvPr>
-        </p:nvSpPr>
-        <p:spPr>
-          <a:xfrm>
-            <a:off x="467544" y="188640"/>
-            <a:ext cx="8229600" cy="1008112"/>
-          </a:xfrm>
-        </p:spPr>
-        <p:txBody>
-          <a:bodyPr/>
-          <a:lstStyle/>
-          <a:p>
-            <a:r>
-              <a:rPr lang="en-GB" b="1" dirty="0" smtClean="0">
-                <a:solidFill>
-                  <a:srgbClr val="009900"/>
-                </a:solidFill>
-              </a:rPr>
-              <a:t>MEKON</a:t>
-            </a:r>
-            <a:r>
-              <a:rPr lang="en-GB" dirty="0" smtClean="0"/>
-              <a:t>/</a:t>
-            </a:r>
-            <a:r>
-              <a:rPr lang="en-GB" b="1" dirty="0" smtClean="0">
-                <a:solidFill>
-                  <a:srgbClr val="1E09B7"/>
-                </a:solidFill>
-              </a:rPr>
-              <a:t>HOBO</a:t>
-            </a:r>
-            <a:r>
-              <a:rPr lang="en-GB" dirty="0" smtClean="0"/>
-              <a:t> very, very briefly…</a:t>
-            </a:r>
-            <a:endParaRPr lang="en-GB" b="1" dirty="0">
-              <a:solidFill>
-                <a:srgbClr val="1E09B7"/>
-              </a:solidFill>
-            </a:endParaRPr>
-          </a:p>
-        </p:txBody>
-      </p:sp>
-      <p:sp>
-        <p:nvSpPr>
-          <p:cNvPr id="7" name="Content Placeholder 2"/>
-          <p:cNvSpPr>
-            <a:spLocks noGrp="1"/>
-          </p:cNvSpPr>
-          <p:nvPr>
-            <p:ph idx="1"/>
-          </p:nvPr>
-        </p:nvSpPr>
-        <p:spPr>
-          <a:xfrm>
-            <a:off x="1331640" y="1268760"/>
-            <a:ext cx="6336704" cy="2736304"/>
-          </a:xfrm>
-          <a:solidFill>
-            <a:schemeClr val="accent3">
-              <a:lumMod val="40000"/>
-              <a:lumOff val="60000"/>
-            </a:schemeClr>
-          </a:solidFill>
-          <a:ln w="28575">
-            <a:solidFill>
-              <a:schemeClr val="tx1"/>
-            </a:solidFill>
-          </a:ln>
-        </p:spPr>
-        <p:txBody>
-          <a:bodyPr>
-            <a:normAutofit fontScale="85000" lnSpcReduction="20000"/>
-          </a:bodyPr>
-          <a:lstStyle/>
-          <a:p>
-            <a:pPr>
-              <a:buNone/>
-            </a:pPr>
-            <a:r>
-              <a:rPr lang="en-GB" sz="2900" b="1" dirty="0" smtClean="0">
-                <a:solidFill>
-                  <a:srgbClr val="009900"/>
-                </a:solidFill>
-              </a:rPr>
-              <a:t>MEKON</a:t>
-            </a:r>
-            <a:r>
-              <a:rPr lang="en-GB" sz="2900" dirty="0" smtClean="0"/>
-              <a:t> based around </a:t>
-            </a:r>
-            <a:r>
-              <a:rPr lang="en-GB" sz="2900" b="1" dirty="0" smtClean="0"/>
-              <a:t>generic</a:t>
-            </a:r>
-            <a:r>
-              <a:rPr lang="en-GB" sz="2900" dirty="0" smtClean="0"/>
-              <a:t> </a:t>
-            </a:r>
-            <a:r>
-              <a:rPr lang="en-GB" sz="2900" b="1" dirty="0" smtClean="0">
-                <a:solidFill>
-                  <a:srgbClr val="009900"/>
-                </a:solidFill>
-              </a:rPr>
-              <a:t>frames</a:t>
-            </a:r>
-            <a:r>
-              <a:rPr lang="en-GB" sz="2900" b="1" dirty="0" smtClean="0">
-                <a:solidFill>
-                  <a:srgbClr val="FF0000"/>
-                </a:solidFill>
-              </a:rPr>
-              <a:t> </a:t>
-            </a:r>
-            <a:r>
-              <a:rPr lang="en-GB" sz="2900" b="1" dirty="0" smtClean="0">
-                <a:solidFill>
-                  <a:srgbClr val="009900"/>
-                </a:solidFill>
-              </a:rPr>
-              <a:t>model</a:t>
-            </a:r>
-            <a:endParaRPr lang="en-GB" sz="2900" dirty="0" smtClean="0">
-              <a:solidFill>
-                <a:srgbClr val="009900"/>
-              </a:solidFill>
-            </a:endParaRPr>
-          </a:p>
-          <a:p>
-            <a:pPr>
-              <a:buFont typeface="Wingdings" pitchFamily="2" charset="2"/>
-              <a:buChar char="§"/>
-            </a:pPr>
-            <a:r>
-              <a:rPr lang="en-GB" sz="2600" dirty="0" smtClean="0"/>
-              <a:t>Simple frame/slot based</a:t>
-            </a:r>
-            <a:r>
-              <a:rPr lang="en-GB" sz="2600" b="1" dirty="0" smtClean="0"/>
-              <a:t> </a:t>
-            </a:r>
-            <a:r>
-              <a:rPr lang="en-GB" sz="2600" dirty="0" smtClean="0"/>
-              <a:t>representation</a:t>
-            </a:r>
-          </a:p>
-          <a:p>
-            <a:pPr>
-              <a:buNone/>
-            </a:pPr>
-            <a:endParaRPr lang="en-GB" sz="900" dirty="0" smtClean="0"/>
-          </a:p>
-          <a:p>
-            <a:pPr>
-              <a:buNone/>
-            </a:pPr>
-            <a:r>
-              <a:rPr lang="en-GB" sz="2900" b="1" dirty="0" smtClean="0"/>
-              <a:t>Plug-in framework</a:t>
-            </a:r>
-            <a:r>
-              <a:rPr lang="en-GB" sz="2900" dirty="0" smtClean="0"/>
-              <a:t> allows incorporation + integration of diverse:</a:t>
-            </a:r>
-          </a:p>
-          <a:p>
-            <a:pPr>
-              <a:buFont typeface="Wingdings" pitchFamily="2" charset="2"/>
-              <a:buChar char="§"/>
-              <a:defRPr/>
-            </a:pPr>
-            <a:r>
-              <a:rPr lang="en-GB" sz="2600" dirty="0" smtClean="0"/>
-              <a:t>Ontology-like </a:t>
-            </a:r>
-            <a:r>
-              <a:rPr lang="en-GB" sz="2600" b="1" dirty="0" smtClean="0">
-                <a:solidFill>
-                  <a:srgbClr val="FF0000"/>
-                </a:solidFill>
-              </a:rPr>
-              <a:t>knowledge sources </a:t>
-            </a:r>
-          </a:p>
-          <a:p>
-            <a:pPr>
-              <a:buFont typeface="Wingdings" pitchFamily="2" charset="2"/>
-              <a:buChar char="§"/>
-              <a:defRPr/>
-            </a:pPr>
-            <a:r>
-              <a:rPr lang="en-GB" sz="2600" dirty="0" smtClean="0"/>
-              <a:t>Associated</a:t>
-            </a:r>
-            <a:r>
-              <a:rPr lang="en-GB" sz="2600" b="1" dirty="0" smtClean="0"/>
-              <a:t> </a:t>
-            </a:r>
-            <a:r>
-              <a:rPr lang="en-GB" sz="2600" b="1" dirty="0" smtClean="0">
-                <a:solidFill>
-                  <a:srgbClr val="FF0000"/>
-                </a:solidFill>
-              </a:rPr>
-              <a:t>reasoning mechanisms</a:t>
-            </a:r>
-          </a:p>
-          <a:p>
-            <a:pPr lvl="0">
-              <a:buNone/>
-              <a:defRPr/>
-            </a:pPr>
-            <a:endParaRPr lang="en-GB" sz="900" b="1" dirty="0" smtClean="0"/>
-          </a:p>
-          <a:p>
-            <a:pPr marL="285750" indent="-285750">
-              <a:buNone/>
-              <a:defRPr/>
-            </a:pPr>
-            <a:r>
-              <a:rPr lang="en-GB" sz="2900" b="1" dirty="0" smtClean="0">
-                <a:solidFill>
-                  <a:srgbClr val="FF0000"/>
-                </a:solidFill>
-              </a:rPr>
-              <a:t>OWL + DL </a:t>
-            </a:r>
-            <a:r>
-              <a:rPr lang="en-GB" sz="2900" dirty="0" smtClean="0"/>
-              <a:t>based</a:t>
-            </a:r>
-            <a:r>
-              <a:rPr lang="en-GB" sz="2900" b="1" dirty="0" smtClean="0"/>
-              <a:t> plug-ins </a:t>
-            </a:r>
-            <a:r>
-              <a:rPr lang="en-GB" sz="2900" dirty="0" smtClean="0"/>
-              <a:t>are provided</a:t>
-            </a:r>
-            <a:endParaRPr lang="en-GB" sz="2900" dirty="0"/>
-          </a:p>
-        </p:txBody>
-      </p:sp>
-      <p:sp>
-        <p:nvSpPr>
-          <p:cNvPr id="9" name="Content Placeholder 2"/>
-          <p:cNvSpPr txBox="1">
-            <a:spLocks/>
-          </p:cNvSpPr>
-          <p:nvPr/>
-        </p:nvSpPr>
-        <p:spPr>
-          <a:xfrm>
-            <a:off x="1331640" y="4365104"/>
-            <a:ext cx="6336704" cy="2016224"/>
-          </a:xfrm>
-          <a:prstGeom prst="rect">
-            <a:avLst/>
-          </a:prstGeom>
-          <a:solidFill>
-            <a:schemeClr val="accent3">
-              <a:lumMod val="40000"/>
-              <a:lumOff val="60000"/>
-            </a:schemeClr>
-          </a:solidFill>
-          <a:ln w="28575">
-            <a:solidFill>
-              <a:schemeClr val="tx1"/>
-            </a:solidFill>
-          </a:ln>
-        </p:spPr>
-        <p:txBody>
-          <a:bodyPr vert="horz" lIns="91440" tIns="45720" rIns="91440" bIns="45720" rtlCol="0">
-            <a:normAutofit fontScale="92500"/>
-          </a:bodyPr>
-          <a:lstStyle/>
-          <a:p>
-            <a:pPr marL="285750" indent="-285750">
-              <a:spcBef>
-                <a:spcPct val="20000"/>
-              </a:spcBef>
-            </a:pPr>
-            <a:r>
-              <a:rPr lang="en-GB" sz="2700" b="1" dirty="0" smtClean="0">
-                <a:solidFill>
-                  <a:srgbClr val="1E09B7"/>
-                </a:solidFill>
-              </a:rPr>
-              <a:t>HOBO</a:t>
-            </a:r>
-            <a:r>
-              <a:rPr lang="en-GB" sz="2700" dirty="0" smtClean="0"/>
-              <a:t> extends </a:t>
-            </a:r>
-            <a:r>
-              <a:rPr lang="en-GB" sz="2700" b="1" dirty="0" smtClean="0">
-                <a:solidFill>
-                  <a:srgbClr val="009900"/>
-                </a:solidFill>
-              </a:rPr>
-              <a:t>MEKON</a:t>
-            </a:r>
-            <a:r>
-              <a:rPr lang="en-GB" sz="2700" dirty="0" smtClean="0"/>
-              <a:t>, enabling the creation of </a:t>
-            </a:r>
-            <a:r>
-              <a:rPr lang="en-GB" sz="2700" b="1" dirty="0" smtClean="0"/>
-              <a:t>domain-specific</a:t>
-            </a:r>
-            <a:r>
-              <a:rPr lang="en-GB" sz="2700" dirty="0" smtClean="0"/>
-              <a:t> </a:t>
-            </a:r>
-            <a:r>
-              <a:rPr lang="en-GB" sz="2700" b="1" dirty="0" smtClean="0">
-                <a:solidFill>
-                  <a:srgbClr val="1E09B7"/>
-                </a:solidFill>
-              </a:rPr>
-              <a:t>object models</a:t>
-            </a:r>
             <a:endParaRPr lang="en-GB" sz="2700" dirty="0" smtClean="0"/>
-          </a:p>
-          <a:p>
-            <a:pPr marL="285750" indent="-285750">
-              <a:spcBef>
-                <a:spcPct val="20000"/>
-              </a:spcBef>
-              <a:buFont typeface="Wingdings" pitchFamily="2" charset="2"/>
-              <a:buChar char="§"/>
-            </a:pPr>
-            <a:r>
-              <a:rPr lang="en-GB" sz="2400" b="1" dirty="0" smtClean="0"/>
-              <a:t>Bound to </a:t>
-            </a:r>
-            <a:r>
-              <a:rPr lang="en-GB" sz="2400" dirty="0" smtClean="0"/>
-              <a:t>appropriately populated </a:t>
-            </a:r>
-            <a:r>
-              <a:rPr lang="en-GB" sz="2400" b="1" dirty="0" smtClean="0">
-                <a:solidFill>
-                  <a:srgbClr val="009900"/>
-                </a:solidFill>
-              </a:rPr>
-              <a:t>frames</a:t>
-            </a:r>
-            <a:r>
-              <a:rPr lang="en-GB" sz="2400" b="1" dirty="0" smtClean="0">
-                <a:solidFill>
-                  <a:srgbClr val="FF0000"/>
-                </a:solidFill>
-              </a:rPr>
-              <a:t> </a:t>
-            </a:r>
-            <a:r>
-              <a:rPr lang="en-GB" sz="2400" b="1" dirty="0" smtClean="0">
-                <a:solidFill>
-                  <a:srgbClr val="009900"/>
-                </a:solidFill>
-              </a:rPr>
-              <a:t>models</a:t>
-            </a:r>
-          </a:p>
-          <a:p>
-            <a:pPr marL="285750" indent="-285750">
-              <a:spcBef>
-                <a:spcPct val="20000"/>
-              </a:spcBef>
-              <a:buFont typeface="Wingdings" pitchFamily="2" charset="2"/>
-              <a:buChar char="§"/>
-            </a:pPr>
-            <a:r>
-              <a:rPr lang="en-GB" sz="2400" dirty="0" smtClean="0"/>
-              <a:t>Instantiations  of </a:t>
-            </a:r>
-            <a:r>
-              <a:rPr lang="en-GB" sz="2400" b="1" dirty="0" smtClean="0">
-                <a:solidFill>
-                  <a:srgbClr val="1E09B7"/>
-                </a:solidFill>
-              </a:rPr>
-              <a:t>object models </a:t>
-            </a:r>
-            <a:r>
-              <a:rPr lang="en-GB" sz="2400" dirty="0" smtClean="0"/>
-              <a:t>operate </a:t>
-            </a:r>
-            <a:r>
-              <a:rPr lang="en-GB" sz="2400" b="1" dirty="0" smtClean="0"/>
-              <a:t>in-tandem </a:t>
-            </a:r>
-            <a:r>
-              <a:rPr lang="en-GB" sz="2400" dirty="0" smtClean="0"/>
-              <a:t>with instantiations of </a:t>
-            </a:r>
-            <a:r>
-              <a:rPr lang="en-GB" sz="2400" b="1" dirty="0" smtClean="0">
-                <a:solidFill>
-                  <a:srgbClr val="009900"/>
-                </a:solidFill>
-              </a:rPr>
-              <a:t>frames</a:t>
-            </a:r>
-            <a:r>
-              <a:rPr lang="en-GB" sz="2400" b="1" dirty="0" smtClean="0">
-                <a:solidFill>
-                  <a:srgbClr val="FF0000"/>
-                </a:solidFill>
-              </a:rPr>
-              <a:t> </a:t>
-            </a:r>
-            <a:r>
-              <a:rPr lang="en-GB" sz="2400" b="1" dirty="0" smtClean="0">
-                <a:solidFill>
-                  <a:srgbClr val="009900"/>
-                </a:solidFill>
-              </a:rPr>
-              <a:t>model</a:t>
-            </a:r>
-          </a:p>
-          <a:p>
-            <a:pPr marL="285750" indent="-285750">
-              <a:spcBef>
-                <a:spcPct val="20000"/>
-              </a:spcBef>
-            </a:pPr>
-            <a:endParaRPr lang="en-GB" sz="2700" b="1" dirty="0" smtClean="0">
-              <a:solidFill>
-                <a:srgbClr val="FF0000"/>
-              </a:solidFill>
-            </a:endParaRPr>
-          </a:p>
-          <a:p>
-            <a:pPr marL="342900" marR="0" lvl="0" indent="-342900" algn="l" defTabSz="914400" rtl="0" eaLnBrk="1" fontAlgn="auto" latinLnBrk="0" hangingPunct="1">
-              <a:lnSpc>
-                <a:spcPct val="100000"/>
-              </a:lnSpc>
-              <a:spcBef>
-                <a:spcPct val="20000"/>
-              </a:spcBef>
-              <a:spcAft>
-                <a:spcPts val="0"/>
-              </a:spcAft>
-              <a:buClrTx/>
-              <a:buSzTx/>
-              <a:buFont typeface="Arial" pitchFamily="34" charset="0"/>
-              <a:buNone/>
-              <a:tabLst/>
-              <a:defRPr/>
-            </a:pPr>
-            <a:endParaRPr kumimoji="0" lang="en-GB" sz="3200" b="0" i="0" u="none" strike="noStrike" kern="1200" cap="none" spc="0" normalizeH="0" baseline="0" noProof="0" dirty="0">
-              <a:ln>
-                <a:noFill/>
-              </a:ln>
-              <a:solidFill>
-                <a:schemeClr val="tx1"/>
-              </a:solidFill>
-              <a:effectLst/>
-              <a:uLnTx/>
-              <a:uFillTx/>
-              <a:latin typeface="+mn-lt"/>
-              <a:ea typeface="+mn-ea"/>
-              <a:cs typeface="+mn-cs"/>
-            </a:endParaRPr>
-          </a:p>
-        </p:txBody>
-      </p:sp>
-    </p:spTree>
-  </p:cSld>
-  <p:clrMapOvr>
-    <a:masterClrMapping/>
-  </p:clrMapOvr>
-  <p:timing>
-    <p:tnLst>
-      <p:par>
-        <p:cTn id="1" dur="indefinite" restart="never" nodeType="tmRoot"/>
-      </p:par>
-    </p:tnLst>
-  </p:timing>
-</p:sld>
-</file>
-
-<file path=ppt/slides/slide8.xml><?xml version="1.0" encoding="utf-8"?>
-<p:sld xmlns:a="http://schemas.openxmlformats.org/drawingml/2006/main" xmlns:r="http://schemas.openxmlformats.org/officeDocument/2006/relationships" xmlns:p="http://schemas.openxmlformats.org/presentationml/2006/main">
-  <p:cSld>
-    <p:spTree>
-      <p:nvGrpSpPr>
-        <p:cNvPr id="1" name=""/>
-        <p:cNvGrpSpPr/>
-        <p:nvPr/>
-      </p:nvGrpSpPr>
-      <p:grpSpPr>
-        <a:xfrm>
-          <a:off x="0" y="0"/>
-          <a:ext cx="0" cy="0"/>
-          <a:chOff x="0" y="0"/>
-          <a:chExt cx="0" cy="0"/>
-        </a:xfrm>
-      </p:grpSpPr>
-      <p:sp>
-        <p:nvSpPr>
-          <p:cNvPr id="2" name="Title 1"/>
-          <p:cNvSpPr>
-            <a:spLocks noGrp="1"/>
-          </p:cNvSpPr>
-          <p:nvPr>
-            <p:ph type="title"/>
-          </p:nvPr>
-        </p:nvSpPr>
-        <p:spPr>
-          <a:xfrm>
-            <a:off x="467544" y="188640"/>
-            <a:ext cx="8229600" cy="1008112"/>
-          </a:xfrm>
-        </p:spPr>
-        <p:txBody>
-          <a:bodyPr/>
-          <a:lstStyle/>
-          <a:p>
-            <a:r>
-              <a:rPr lang="en-GB" b="1" dirty="0" smtClean="0">
-                <a:solidFill>
-                  <a:srgbClr val="009900"/>
-                </a:solidFill>
-              </a:rPr>
-              <a:t>MEKON</a:t>
-            </a:r>
-            <a:r>
-              <a:rPr lang="en-GB" dirty="0" smtClean="0"/>
-              <a:t>/</a:t>
-            </a:r>
-            <a:r>
-              <a:rPr lang="en-GB" b="1" dirty="0" smtClean="0">
-                <a:solidFill>
-                  <a:srgbClr val="1E09B7"/>
-                </a:solidFill>
-              </a:rPr>
-              <a:t>HOBO</a:t>
-            </a:r>
-            <a:r>
-              <a:rPr lang="en-GB" dirty="0" smtClean="0"/>
-              <a:t> also come with…</a:t>
-            </a:r>
-            <a:endParaRPr lang="en-GB" b="1" dirty="0">
-              <a:solidFill>
-                <a:srgbClr val="1E09B7"/>
-              </a:solidFill>
-            </a:endParaRPr>
-          </a:p>
-        </p:txBody>
-      </p:sp>
-      <p:sp>
-        <p:nvSpPr>
-          <p:cNvPr id="14" name="Content Placeholder 2"/>
-          <p:cNvSpPr>
-            <a:spLocks noGrp="1"/>
-          </p:cNvSpPr>
-          <p:nvPr>
-            <p:ph idx="1"/>
-          </p:nvPr>
-        </p:nvSpPr>
-        <p:spPr>
-          <a:xfrm>
-            <a:off x="971600" y="1340768"/>
-            <a:ext cx="7200800" cy="2736304"/>
-          </a:xfrm>
-          <a:solidFill>
-            <a:schemeClr val="accent3">
-              <a:lumMod val="40000"/>
-              <a:lumOff val="60000"/>
-            </a:schemeClr>
-          </a:solidFill>
-          <a:ln w="28575">
-            <a:solidFill>
-              <a:schemeClr val="tx1"/>
-            </a:solidFill>
-          </a:ln>
-        </p:spPr>
-        <p:txBody>
-          <a:bodyPr>
-            <a:noAutofit/>
-          </a:bodyPr>
-          <a:lstStyle/>
-          <a:p>
-            <a:pPr lvl="0">
-              <a:buNone/>
-            </a:pPr>
-            <a:r>
-              <a:rPr lang="en-GB" sz="2500" b="1" dirty="0" smtClean="0">
-                <a:solidFill>
-                  <a:schemeClr val="accent6">
-                    <a:lumMod val="75000"/>
-                  </a:schemeClr>
-                </a:solidFill>
-              </a:rPr>
-              <a:t>Instance Store </a:t>
-            </a:r>
-            <a:r>
-              <a:rPr lang="en-GB" sz="2500" dirty="0" smtClean="0"/>
-              <a:t>mechanism, operates via </a:t>
-            </a:r>
-            <a:r>
-              <a:rPr lang="en-GB" sz="2500" b="1" dirty="0" smtClean="0"/>
-              <a:t>plug-in framework</a:t>
-            </a:r>
-          </a:p>
-          <a:p>
-            <a:pPr lvl="0">
-              <a:buNone/>
-            </a:pPr>
-            <a:endParaRPr lang="en-GB" sz="800" b="1" dirty="0" smtClean="0"/>
-          </a:p>
-          <a:p>
-            <a:pPr lvl="0">
-              <a:buNone/>
-            </a:pPr>
-            <a:r>
-              <a:rPr lang="en-GB" sz="2500" b="1" dirty="0" smtClean="0"/>
-              <a:t>Current plug-ins </a:t>
-            </a:r>
-            <a:r>
-              <a:rPr lang="en-GB" sz="2500" dirty="0" smtClean="0"/>
-              <a:t>based on:</a:t>
-            </a:r>
-          </a:p>
-          <a:p>
-            <a:pPr>
-              <a:buFont typeface="Wingdings" pitchFamily="2" charset="2"/>
-              <a:buChar char="§"/>
-            </a:pPr>
-            <a:r>
-              <a:rPr lang="en-GB" sz="2200" b="1" dirty="0" smtClean="0">
-                <a:solidFill>
-                  <a:srgbClr val="FF0000"/>
-                </a:solidFill>
-              </a:rPr>
-              <a:t>OWL</a:t>
-            </a:r>
-            <a:r>
-              <a:rPr lang="en-GB" sz="2200" b="1" dirty="0" smtClean="0"/>
-              <a:t> </a:t>
-            </a:r>
-            <a:r>
-              <a:rPr lang="en-GB" sz="2200" dirty="0" smtClean="0"/>
-              <a:t>constructs</a:t>
-            </a:r>
-            <a:r>
-              <a:rPr lang="en-GB" sz="2200" b="1" dirty="0" smtClean="0"/>
-              <a:t> </a:t>
-            </a:r>
-            <a:r>
-              <a:rPr lang="en-GB" sz="2200" dirty="0" smtClean="0"/>
-              <a:t>+</a:t>
-            </a:r>
-            <a:r>
-              <a:rPr lang="en-GB" sz="2200" b="1" dirty="0" smtClean="0"/>
-              <a:t> </a:t>
-            </a:r>
-            <a:r>
-              <a:rPr lang="en-GB" sz="2200" b="1" dirty="0" smtClean="0">
-                <a:solidFill>
-                  <a:srgbClr val="FF0000"/>
-                </a:solidFill>
-              </a:rPr>
-              <a:t>DL</a:t>
-            </a:r>
-            <a:r>
-              <a:rPr lang="en-GB" sz="2200" dirty="0" smtClean="0"/>
-              <a:t> reasoning</a:t>
-            </a:r>
-          </a:p>
-          <a:p>
-            <a:pPr>
-              <a:buFont typeface="Wingdings" pitchFamily="2" charset="2"/>
-              <a:buChar char="§"/>
-            </a:pPr>
-            <a:r>
-              <a:rPr lang="en-GB" sz="2200" b="1" dirty="0" smtClean="0">
-                <a:solidFill>
-                  <a:srgbClr val="FF0000"/>
-                </a:solidFill>
-              </a:rPr>
-              <a:t>RDF</a:t>
-            </a:r>
-            <a:r>
-              <a:rPr lang="en-GB" sz="2200" dirty="0" smtClean="0"/>
-              <a:t> (</a:t>
-            </a:r>
-            <a:r>
-              <a:rPr lang="en-GB" sz="2200" dirty="0" err="1"/>
-              <a:t>Stardog</a:t>
-            </a:r>
-            <a:r>
-              <a:rPr lang="en-GB" sz="2200" dirty="0"/>
-              <a:t> </a:t>
-            </a:r>
-            <a:r>
-              <a:rPr lang="en-GB" sz="2200" dirty="0" smtClean="0"/>
-              <a:t>or Jena</a:t>
-            </a:r>
-            <a:r>
-              <a:rPr lang="en-GB" sz="2200" dirty="0"/>
-              <a:t>) </a:t>
-            </a:r>
-            <a:r>
-              <a:rPr lang="en-GB" sz="2200" dirty="0" smtClean="0"/>
-              <a:t>+ </a:t>
-            </a:r>
-            <a:r>
-              <a:rPr lang="en-GB" sz="2200" b="1" dirty="0" smtClean="0">
-                <a:solidFill>
-                  <a:srgbClr val="FF0000"/>
-                </a:solidFill>
-              </a:rPr>
-              <a:t>SPARQL</a:t>
-            </a:r>
-          </a:p>
-          <a:p>
-            <a:pPr>
-              <a:buFont typeface="Wingdings" pitchFamily="2" charset="2"/>
-              <a:buChar char="§"/>
-            </a:pPr>
-            <a:r>
-              <a:rPr lang="en-GB" sz="2200" dirty="0" smtClean="0"/>
-              <a:t>The </a:t>
-            </a:r>
-            <a:r>
-              <a:rPr lang="en-GB" sz="2200" b="1" dirty="0">
-                <a:solidFill>
-                  <a:srgbClr val="FF0000"/>
-                </a:solidFill>
-              </a:rPr>
-              <a:t>XML database</a:t>
-            </a:r>
-            <a:r>
-              <a:rPr lang="en-GB" sz="2200" dirty="0"/>
-              <a:t>, </a:t>
-            </a:r>
-            <a:r>
-              <a:rPr lang="en-GB" sz="2200" dirty="0" err="1" smtClean="0"/>
-              <a:t>BaseX</a:t>
-            </a:r>
-            <a:endParaRPr lang="en-GB" sz="2200" dirty="0" smtClean="0">
-              <a:solidFill>
-                <a:srgbClr val="FF0000"/>
-              </a:solidFill>
-            </a:endParaRPr>
-          </a:p>
-        </p:txBody>
-      </p:sp>
-      <p:sp>
-        <p:nvSpPr>
-          <p:cNvPr id="16" name="Content Placeholder 4"/>
-          <p:cNvSpPr txBox="1">
-            <a:spLocks/>
-          </p:cNvSpPr>
-          <p:nvPr/>
-        </p:nvSpPr>
-        <p:spPr>
-          <a:xfrm>
-            <a:off x="971600" y="4365104"/>
-            <a:ext cx="7200800" cy="1944216"/>
-          </a:xfrm>
-          <a:prstGeom prst="rect">
-            <a:avLst/>
-          </a:prstGeom>
-          <a:ln w="28575">
-            <a:solidFill>
-              <a:schemeClr val="tx1"/>
-            </a:solidFill>
-          </a:ln>
-        </p:spPr>
-        <p:txBody>
-          <a:bodyPr vert="horz" lIns="91440" tIns="45720" rIns="91440" bIns="45720" rtlCol="0">
-            <a:normAutofit fontScale="85000" lnSpcReduction="10000"/>
-          </a:bodyPr>
-          <a:lstStyle/>
-          <a:p>
-            <a:pPr marL="342900" marR="0" lvl="0" indent="-342900" algn="l" defTabSz="914400" rtl="0" eaLnBrk="1" fontAlgn="auto" latinLnBrk="0" hangingPunct="1">
-              <a:lnSpc>
-                <a:spcPct val="100000"/>
-              </a:lnSpc>
-              <a:spcBef>
-                <a:spcPct val="20000"/>
-              </a:spcBef>
-              <a:spcAft>
-                <a:spcPts val="0"/>
-              </a:spcAft>
-              <a:buClrTx/>
-              <a:buSzTx/>
-              <a:buFont typeface="Arial" pitchFamily="34" charset="0"/>
-              <a:buNone/>
-              <a:tabLst/>
-              <a:defRPr/>
-            </a:pPr>
-            <a:r>
-              <a:rPr kumimoji="0" lang="en-GB" sz="2900" b="1" i="0" u="none" strike="noStrike" kern="1200" cap="none" spc="0" normalizeH="0" baseline="0" noProof="0" dirty="0" smtClean="0">
-                <a:ln>
-                  <a:noFill/>
-                </a:ln>
-                <a:solidFill>
-                  <a:schemeClr val="accent6">
-                    <a:lumMod val="75000"/>
-                  </a:schemeClr>
-                </a:solidFill>
-                <a:effectLst/>
-                <a:uLnTx/>
-                <a:uFillTx/>
-                <a:latin typeface="+mn-lt"/>
-                <a:ea typeface="+mn-ea"/>
-                <a:cs typeface="+mn-cs"/>
-              </a:rPr>
-              <a:t>Model Explorer </a:t>
-            </a:r>
-            <a:r>
-              <a:rPr kumimoji="0" lang="en-GB" sz="2900" b="0" i="0" u="none" strike="noStrike" kern="1200" cap="none" spc="0" normalizeH="0" baseline="0" noProof="0" dirty="0" smtClean="0">
-                <a:ln>
-                  <a:noFill/>
-                </a:ln>
-                <a:solidFill>
-                  <a:schemeClr val="tx1"/>
-                </a:solidFill>
-                <a:effectLst/>
-                <a:uLnTx/>
-                <a:uFillTx/>
-                <a:latin typeface="+mn-lt"/>
-                <a:ea typeface="+mn-ea"/>
-                <a:cs typeface="+mn-cs"/>
-              </a:rPr>
-              <a:t>GUI,</a:t>
-            </a:r>
-            <a:r>
-              <a:rPr kumimoji="0" lang="en-GB" sz="2900" b="0" i="0" u="none" strike="noStrike" kern="1200" cap="none" spc="0" normalizeH="0" noProof="0" dirty="0" smtClean="0">
-                <a:ln>
-                  <a:noFill/>
-                </a:ln>
-                <a:solidFill>
-                  <a:schemeClr val="tx1"/>
-                </a:solidFill>
-                <a:effectLst/>
-                <a:uLnTx/>
-                <a:uFillTx/>
-                <a:latin typeface="+mn-lt"/>
-                <a:ea typeface="+mn-ea"/>
-                <a:cs typeface="+mn-cs"/>
-              </a:rPr>
-              <a:t> </a:t>
-            </a:r>
-            <a:r>
-              <a:rPr lang="en-GB" sz="2900" dirty="0" smtClean="0"/>
-              <a:t>enables </a:t>
-            </a:r>
-            <a:r>
-              <a:rPr lang="en-GB" sz="2900" b="1" dirty="0" smtClean="0"/>
-              <a:t>model developer </a:t>
-            </a:r>
-            <a:r>
-              <a:rPr lang="en-GB" sz="2900" dirty="0" smtClean="0"/>
-              <a:t>to:</a:t>
-            </a:r>
-          </a:p>
-          <a:p>
-            <a:pPr marL="285750" indent="-285750">
-              <a:spcBef>
-                <a:spcPct val="20000"/>
-              </a:spcBef>
-              <a:buFont typeface="Wingdings" pitchFamily="2" charset="2"/>
-              <a:buChar char="§"/>
-            </a:pPr>
-            <a:r>
-              <a:rPr lang="en-GB" sz="2600" b="1" dirty="0" smtClean="0"/>
-              <a:t>Browse </a:t>
-            </a:r>
-            <a:r>
-              <a:rPr lang="en-GB" sz="2600" b="1" dirty="0" smtClean="0">
-                <a:solidFill>
-                  <a:srgbClr val="009900"/>
-                </a:solidFill>
-              </a:rPr>
-              <a:t>frames</a:t>
-            </a:r>
-            <a:r>
-              <a:rPr lang="en-GB" sz="2600" b="1" dirty="0" smtClean="0">
-                <a:solidFill>
-                  <a:srgbClr val="FF0000"/>
-                </a:solidFill>
-              </a:rPr>
-              <a:t> </a:t>
-            </a:r>
-            <a:r>
-              <a:rPr lang="en-GB" sz="2600" b="1" dirty="0" smtClean="0">
-                <a:solidFill>
-                  <a:srgbClr val="009900"/>
-                </a:solidFill>
-              </a:rPr>
-              <a:t>model</a:t>
-            </a:r>
-          </a:p>
-          <a:p>
-            <a:pPr marL="285750" indent="-285750">
-              <a:spcBef>
-                <a:spcPct val="20000"/>
-              </a:spcBef>
-              <a:buFont typeface="Wingdings" pitchFamily="2" charset="2"/>
-              <a:buChar char="§"/>
-            </a:pPr>
-            <a:r>
-              <a:rPr lang="en-GB" sz="2600" dirty="0" smtClean="0"/>
-              <a:t>Explore </a:t>
-            </a:r>
-            <a:r>
-              <a:rPr lang="en-GB" sz="2600" b="1" dirty="0" smtClean="0"/>
-              <a:t>dynamic behaviour </a:t>
-            </a:r>
-            <a:r>
-              <a:rPr lang="en-GB" sz="2600" dirty="0" smtClean="0"/>
-              <a:t>of specific instantiations</a:t>
-            </a:r>
-          </a:p>
-          <a:p>
-            <a:pPr marL="742950" lvl="1" indent="-285750">
-              <a:spcBef>
-                <a:spcPct val="20000"/>
-              </a:spcBef>
-              <a:buFont typeface="Wingdings" pitchFamily="2" charset="2"/>
-              <a:buChar char="§"/>
-            </a:pPr>
-            <a:r>
-              <a:rPr lang="en-GB" sz="2600" dirty="0" smtClean="0"/>
-              <a:t>As provided via </a:t>
-            </a:r>
-            <a:r>
-              <a:rPr lang="en-GB" sz="2600" b="1" dirty="0" smtClean="0">
-                <a:solidFill>
-                  <a:srgbClr val="FF0000"/>
-                </a:solidFill>
-              </a:rPr>
-              <a:t>external </a:t>
-            </a:r>
-            <a:r>
-              <a:rPr lang="en-GB" sz="2600" b="1" dirty="0" err="1" smtClean="0">
-                <a:solidFill>
-                  <a:srgbClr val="FF0000"/>
-                </a:solidFill>
-              </a:rPr>
-              <a:t>reasoners</a:t>
-            </a:r>
-            <a:r>
-              <a:rPr lang="en-GB" sz="2600" b="1" dirty="0" smtClean="0">
-                <a:solidFill>
-                  <a:srgbClr val="FF0000"/>
-                </a:solidFill>
-              </a:rPr>
-              <a:t> </a:t>
-            </a:r>
-            <a:r>
-              <a:rPr lang="en-GB" sz="2600" dirty="0" smtClean="0"/>
-              <a:t>or </a:t>
-            </a:r>
-            <a:r>
-              <a:rPr lang="en-GB" sz="2600" b="1" dirty="0" smtClean="0">
-                <a:solidFill>
-                  <a:srgbClr val="1E09B7"/>
-                </a:solidFill>
-              </a:rPr>
-              <a:t>object model</a:t>
-            </a:r>
-            <a:endParaRPr lang="en-GB" sz="2600" dirty="0" smtClean="0"/>
-          </a:p>
-          <a:p>
-            <a:pPr marL="285750" indent="-285750">
-              <a:spcBef>
-                <a:spcPct val="20000"/>
-              </a:spcBef>
-              <a:buFont typeface="Wingdings" pitchFamily="2" charset="2"/>
-              <a:buChar char="§"/>
-            </a:pPr>
-            <a:r>
-              <a:rPr lang="en-GB" sz="2600" b="1" dirty="0" smtClean="0"/>
-              <a:t>Exercise</a:t>
-            </a:r>
-            <a:r>
-              <a:rPr lang="en-GB" sz="2600" dirty="0" smtClean="0"/>
-              <a:t> </a:t>
-            </a:r>
-            <a:r>
-              <a:rPr lang="en-GB" sz="2600" b="1" dirty="0" smtClean="0">
-                <a:solidFill>
-                  <a:schemeClr val="accent6">
-                    <a:lumMod val="75000"/>
-                  </a:schemeClr>
-                </a:solidFill>
-              </a:rPr>
-              <a:t>instance store </a:t>
-            </a:r>
-            <a:r>
-              <a:rPr lang="en-GB" sz="2600" dirty="0" smtClean="0"/>
-              <a:t>(store instances / execute queries)</a:t>
-            </a:r>
-            <a:endParaRPr lang="en-GB" sz="2600" dirty="0" smtClean="0">
-              <a:solidFill>
-                <a:schemeClr val="accent6">
-                  <a:lumMod val="75000"/>
-                </a:schemeClr>
-              </a:solidFill>
-            </a:endParaRPr>
-          </a:p>
-        </p:txBody>
-      </p:sp>
-    </p:spTree>
-  </p:cSld>
-  <p:clrMapOvr>
-    <a:masterClrMapping/>
-  </p:clrMapOvr>
-  <p:timing>
-    <p:tnLst>
-      <p:par>
-        <p:cTn id="1" dur="indefinite" restart="never" nodeType="tmRoot"/>
-      </p:par>
-    </p:tnLst>
-  </p:timing>
-</p:sld>
-</file>
-
-<file path=ppt/slides/slide9.xml><?xml version="1.0" encoding="utf-8"?>
-<p:sld xmlns:a="http://schemas.openxmlformats.org/drawingml/2006/main" xmlns:r="http://schemas.openxmlformats.org/officeDocument/2006/relationships" xmlns:p="http://schemas.openxmlformats.org/presentationml/2006/main">
-  <p:cSld>
-    <p:spTree>
-      <p:nvGrpSpPr>
-        <p:cNvPr id="1" name=""/>
-        <p:cNvGrpSpPr/>
-        <p:nvPr/>
-      </p:nvGrpSpPr>
-      <p:grpSpPr>
-        <a:xfrm>
-          <a:off x="0" y="0"/>
-          <a:ext cx="0" cy="0"/>
-          <a:chOff x="0" y="0"/>
-          <a:chExt cx="0" cy="0"/>
-        </a:xfrm>
-      </p:grpSpPr>
-      <p:sp>
-        <p:nvSpPr>
-          <p:cNvPr id="2" name="Title 1"/>
-          <p:cNvSpPr>
-            <a:spLocks noGrp="1"/>
-          </p:cNvSpPr>
-          <p:nvPr>
-            <p:ph type="title"/>
-          </p:nvPr>
-        </p:nvSpPr>
-        <p:spPr>
-          <a:xfrm>
-            <a:off x="467544" y="188640"/>
-            <a:ext cx="8229600" cy="1008112"/>
-          </a:xfrm>
-        </p:spPr>
-        <p:txBody>
-          <a:bodyPr/>
-          <a:lstStyle/>
-          <a:p>
-            <a:r>
-              <a:rPr lang="en-GB" dirty="0" smtClean="0"/>
-              <a:t>Why use </a:t>
-            </a:r>
-            <a:r>
-              <a:rPr lang="en-GB" b="1" dirty="0" smtClean="0">
-                <a:solidFill>
-                  <a:srgbClr val="009900"/>
-                </a:solidFill>
-              </a:rPr>
-              <a:t>MEKON</a:t>
-            </a:r>
-            <a:r>
-              <a:rPr lang="en-GB" b="1" dirty="0" smtClean="0"/>
-              <a:t> </a:t>
-            </a:r>
-            <a:r>
-              <a:rPr lang="en-GB" dirty="0" smtClean="0"/>
-              <a:t>+</a:t>
-            </a:r>
-            <a:r>
-              <a:rPr lang="en-GB" b="1" dirty="0" smtClean="0"/>
-              <a:t> </a:t>
-            </a:r>
-            <a:r>
-              <a:rPr lang="en-GB" b="1" dirty="0" smtClean="0">
-                <a:solidFill>
-                  <a:srgbClr val="1E09B7"/>
-                </a:solidFill>
-              </a:rPr>
-              <a:t>HOBO</a:t>
-            </a:r>
-            <a:r>
-              <a:rPr lang="en-GB" dirty="0" smtClean="0"/>
-              <a:t>?</a:t>
-            </a:r>
-            <a:endParaRPr lang="en-GB" b="1" dirty="0">
-              <a:solidFill>
-                <a:srgbClr val="1E09B7"/>
-              </a:solidFill>
-            </a:endParaRPr>
-          </a:p>
-        </p:txBody>
-      </p:sp>
-      <p:sp>
-        <p:nvSpPr>
-          <p:cNvPr id="3" name="Content Placeholder 2"/>
-          <p:cNvSpPr>
-            <a:spLocks noGrp="1"/>
-          </p:cNvSpPr>
-          <p:nvPr>
-            <p:ph idx="1"/>
-          </p:nvPr>
-        </p:nvSpPr>
-        <p:spPr>
-          <a:xfrm>
-            <a:off x="827584" y="1412776"/>
-            <a:ext cx="7488832" cy="4680520"/>
-          </a:xfrm>
-          <a:solidFill>
-            <a:schemeClr val="accent3">
-              <a:lumMod val="40000"/>
-              <a:lumOff val="60000"/>
-            </a:schemeClr>
-          </a:solidFill>
-          <a:ln w="28575">
-            <a:solidFill>
-              <a:schemeClr val="tx1"/>
-            </a:solidFill>
-          </a:ln>
-        </p:spPr>
-        <p:txBody>
-          <a:bodyPr>
-            <a:normAutofit fontScale="92500" lnSpcReduction="20000"/>
-          </a:bodyPr>
-          <a:lstStyle/>
-          <a:p>
-            <a:pPr>
-              <a:buNone/>
-            </a:pPr>
-            <a:r>
-              <a:rPr lang="en-GB" sz="3100" dirty="0" smtClean="0"/>
-              <a:t>For </a:t>
-            </a:r>
-            <a:r>
-              <a:rPr lang="en-GB" sz="3100" b="1" dirty="0" smtClean="0"/>
-              <a:t>software developers</a:t>
-            </a:r>
-            <a:r>
-              <a:rPr lang="en-GB" sz="3100" dirty="0" smtClean="0"/>
-              <a:t> they…</a:t>
-            </a:r>
-          </a:p>
-          <a:p>
-            <a:pPr>
-              <a:buFont typeface="Wingdings" pitchFamily="2" charset="2"/>
-              <a:buChar char="§"/>
-            </a:pPr>
-            <a:r>
-              <a:rPr lang="en-GB" sz="2800" dirty="0" smtClean="0"/>
-              <a:t>Provide </a:t>
-            </a:r>
-            <a:r>
-              <a:rPr lang="en-GB" sz="2800" b="1" dirty="0" smtClean="0"/>
-              <a:t>appropriate layered architecture</a:t>
-            </a:r>
-            <a:r>
-              <a:rPr lang="en-GB" sz="2800" dirty="0" smtClean="0"/>
-              <a:t>:</a:t>
-            </a:r>
-          </a:p>
-          <a:p>
-            <a:pPr marL="685800" lvl="1">
-              <a:buFont typeface="Wingdings" pitchFamily="2" charset="2"/>
-              <a:buChar char="§"/>
-            </a:pPr>
-            <a:r>
-              <a:rPr lang="en-GB" sz="2600" dirty="0" smtClean="0"/>
-              <a:t>Structured means of combining:</a:t>
-            </a:r>
-          </a:p>
-          <a:p>
-            <a:pPr marL="1085850" lvl="2">
-              <a:buFont typeface="Wingdings" pitchFamily="2" charset="2"/>
-              <a:buChar char="§"/>
-              <a:defRPr/>
-            </a:pPr>
-            <a:r>
-              <a:rPr lang="en-GB" dirty="0" smtClean="0"/>
-              <a:t>Diverse </a:t>
-            </a:r>
-            <a:r>
-              <a:rPr lang="en-GB" b="1" dirty="0" smtClean="0">
-                <a:solidFill>
-                  <a:srgbClr val="FF0000"/>
-                </a:solidFill>
-              </a:rPr>
-              <a:t>knowledge sources</a:t>
-            </a:r>
-            <a:r>
-              <a:rPr lang="en-GB" dirty="0" smtClean="0"/>
-              <a:t> + </a:t>
-            </a:r>
-            <a:r>
-              <a:rPr lang="en-GB" b="1" dirty="0" err="1" smtClean="0">
-                <a:solidFill>
-                  <a:srgbClr val="FF0000"/>
-                </a:solidFill>
-              </a:rPr>
-              <a:t>reasonners</a:t>
-            </a:r>
-            <a:endParaRPr lang="en-GB" b="1" dirty="0" smtClean="0">
-              <a:solidFill>
-                <a:srgbClr val="FF0000"/>
-              </a:solidFill>
-            </a:endParaRPr>
-          </a:p>
-          <a:p>
-            <a:pPr marL="1085850" lvl="2">
-              <a:buFont typeface="Wingdings" pitchFamily="2" charset="2"/>
-              <a:buChar char="§"/>
-              <a:defRPr/>
-            </a:pPr>
-            <a:r>
-              <a:rPr lang="en-GB" b="1" dirty="0" smtClean="0">
-                <a:solidFill>
-                  <a:srgbClr val="FF0000"/>
-                </a:solidFill>
-              </a:rPr>
-              <a:t>Generic reasoning </a:t>
-            </a:r>
-            <a:r>
-              <a:rPr lang="en-GB" dirty="0" smtClean="0"/>
-              <a:t>+ </a:t>
-            </a:r>
-            <a:r>
-              <a:rPr lang="en-GB" b="1" dirty="0" smtClean="0">
-                <a:solidFill>
-                  <a:srgbClr val="1E09B7"/>
-                </a:solidFill>
-              </a:rPr>
-              <a:t>domain-specific processing</a:t>
-            </a:r>
-          </a:p>
-          <a:p>
-            <a:pPr lvl="1">
-              <a:buFont typeface="Wingdings" pitchFamily="2" charset="2"/>
-              <a:buChar char="§"/>
-            </a:pPr>
-            <a:r>
-              <a:rPr lang="en-GB" sz="2600" dirty="0" smtClean="0"/>
-              <a:t>Configurable via creation/customisation of plug-ins</a:t>
-            </a:r>
-          </a:p>
-          <a:p>
-            <a:pPr>
-              <a:buFont typeface="Wingdings" pitchFamily="2" charset="2"/>
-              <a:buChar char="§"/>
-            </a:pPr>
-            <a:r>
-              <a:rPr lang="en-GB" sz="2800" dirty="0" smtClean="0"/>
-              <a:t>Handle much of the </a:t>
-            </a:r>
-            <a:r>
-              <a:rPr lang="en-GB" sz="2800" b="1" dirty="0" smtClean="0"/>
-              <a:t>dirty work</a:t>
-            </a:r>
-            <a:r>
-              <a:rPr lang="en-GB" sz="2800" dirty="0" smtClean="0"/>
-              <a:t>:</a:t>
-            </a:r>
-          </a:p>
-          <a:p>
-            <a:pPr lvl="1">
-              <a:buFont typeface="Wingdings" pitchFamily="2" charset="2"/>
-              <a:buChar char="§"/>
-            </a:pPr>
-            <a:r>
-              <a:rPr lang="en-GB" sz="2600" dirty="0" smtClean="0"/>
-              <a:t>Lower-level interaction with </a:t>
-            </a:r>
-            <a:r>
-              <a:rPr lang="en-GB" sz="2600" b="1" dirty="0" err="1" smtClean="0">
-                <a:solidFill>
-                  <a:srgbClr val="FF0000"/>
-                </a:solidFill>
-              </a:rPr>
-              <a:t>ontologies</a:t>
-            </a:r>
-            <a:r>
-              <a:rPr lang="en-GB" sz="2600" dirty="0" smtClean="0"/>
-              <a:t>/</a:t>
-            </a:r>
-            <a:r>
-              <a:rPr lang="en-GB" sz="2600" b="1" dirty="0" err="1" smtClean="0">
-                <a:solidFill>
-                  <a:srgbClr val="FF0000"/>
-                </a:solidFill>
-              </a:rPr>
-              <a:t>reasoners</a:t>
-            </a:r>
-            <a:endParaRPr lang="en-GB" sz="2600" b="1" dirty="0" smtClean="0">
-              <a:solidFill>
-                <a:srgbClr val="FF0000"/>
-              </a:solidFill>
-            </a:endParaRPr>
-          </a:p>
-          <a:p>
-            <a:pPr lvl="1">
-              <a:buFont typeface="Wingdings" pitchFamily="2" charset="2"/>
-              <a:buChar char="§"/>
-            </a:pPr>
-            <a:r>
-              <a:rPr lang="en-GB" sz="2600" dirty="0" smtClean="0"/>
-              <a:t>Intermediate-level processing</a:t>
-            </a:r>
-          </a:p>
-          <a:p>
-            <a:pPr>
-              <a:buFont typeface="Wingdings" pitchFamily="2" charset="2"/>
-              <a:buChar char="§"/>
-            </a:pPr>
-            <a:r>
-              <a:rPr lang="en-GB" sz="2800" dirty="0" smtClean="0"/>
-              <a:t>Provide client access via </a:t>
-            </a:r>
-            <a:r>
-              <a:rPr lang="en-GB" sz="2800" b="1" dirty="0" smtClean="0"/>
-              <a:t>appropriate APIs</a:t>
-            </a:r>
-            <a:r>
-              <a:rPr lang="en-GB" sz="2800" dirty="0" smtClean="0"/>
-              <a:t>:</a:t>
-            </a:r>
-          </a:p>
-          <a:p>
-            <a:pPr lvl="1">
-              <a:buFont typeface="Wingdings" pitchFamily="2" charset="2"/>
-              <a:buChar char="§"/>
-            </a:pPr>
-            <a:r>
-              <a:rPr lang="en-GB" sz="2600" dirty="0" smtClean="0"/>
-              <a:t>Generic </a:t>
-            </a:r>
-            <a:r>
-              <a:rPr lang="en-GB" sz="2600" b="1" dirty="0" smtClean="0">
-                <a:solidFill>
-                  <a:srgbClr val="009900"/>
-                </a:solidFill>
-              </a:rPr>
-              <a:t>frames</a:t>
-            </a:r>
-            <a:r>
-              <a:rPr lang="en-GB" sz="2600" b="1" dirty="0" smtClean="0">
-                <a:solidFill>
-                  <a:srgbClr val="FF0000"/>
-                </a:solidFill>
-              </a:rPr>
-              <a:t> </a:t>
-            </a:r>
-            <a:r>
-              <a:rPr lang="en-GB" sz="2600" b="1" dirty="0" smtClean="0">
-                <a:solidFill>
-                  <a:srgbClr val="009900"/>
-                </a:solidFill>
-              </a:rPr>
-              <a:t>model</a:t>
-            </a:r>
-          </a:p>
-          <a:p>
-            <a:pPr lvl="1">
-              <a:buFont typeface="Wingdings" pitchFamily="2" charset="2"/>
-              <a:buChar char="§"/>
-            </a:pPr>
-            <a:r>
-              <a:rPr lang="en-GB" sz="2600" dirty="0" smtClean="0"/>
-              <a:t>Domain-specific </a:t>
-            </a:r>
-            <a:r>
-              <a:rPr lang="en-GB" sz="2600" b="1" dirty="0" smtClean="0">
-                <a:solidFill>
-                  <a:srgbClr val="1E09B7"/>
-                </a:solidFill>
-              </a:rPr>
-              <a:t>object models</a:t>
-            </a:r>
-          </a:p>
-          <a:p>
-            <a:pPr>
-              <a:buNone/>
-            </a:pPr>
-            <a:endParaRPr lang="en-GB" b="1" dirty="0" smtClean="0"/>
           </a:p>
         </p:txBody>
       </p:sp>

</xml_diff>

<commit_message>
Fixed minor typo in "MEKON-HOBO in a nutshell.pptx"
</commit_message>
<xml_diff>
--- a/docs/MEKON-HOBO in a nutshell.pptx
+++ b/docs/MEKON-HOBO in a nutshell.pptx
@@ -109,6 +109,22 @@
       </a:defRPr>
     </a:lvl9pPr>
   </p:defaultTextStyle>
+  <p:extLst>
+    <p:ext uri="{EFAFB233-063F-42B5-8137-9DF3F51BA10A}">
+      <p15:sldGuideLst xmlns:p15="http://schemas.microsoft.com/office/powerpoint/2012/main">
+        <p15:guide id="1" orient="horz" pos="2160">
+          <p15:clr>
+            <a:srgbClr val="A4A3A4"/>
+          </p15:clr>
+        </p15:guide>
+        <p15:guide id="2" pos="2880">
+          <p15:clr>
+            <a:srgbClr val="A4A3A4"/>
+          </p15:clr>
+        </p15:guide>
+      </p15:sldGuideLst>
+    </p:ext>
+  </p:extLst>
 </p:presentation>
 </file>
 
@@ -294,7 +310,7 @@
             <a:fld id="{766BFC5D-BA65-4295-843C-5BFF75191D5F}" type="datetimeFigureOut">
               <a:rPr lang="en-GB" smtClean="0"/>
               <a:pPr/>
-              <a:t>13/04/2016</a:t>
+              <a:t>26/05/2017</a:t>
             </a:fld>
             <a:endParaRPr lang="en-GB"/>
           </a:p>
@@ -461,7 +477,7 @@
             <a:fld id="{766BFC5D-BA65-4295-843C-5BFF75191D5F}" type="datetimeFigureOut">
               <a:rPr lang="en-GB" smtClean="0"/>
               <a:pPr/>
-              <a:t>13/04/2016</a:t>
+              <a:t>26/05/2017</a:t>
             </a:fld>
             <a:endParaRPr lang="en-GB"/>
           </a:p>
@@ -638,7 +654,7 @@
             <a:fld id="{766BFC5D-BA65-4295-843C-5BFF75191D5F}" type="datetimeFigureOut">
               <a:rPr lang="en-GB" smtClean="0"/>
               <a:pPr/>
-              <a:t>13/04/2016</a:t>
+              <a:t>26/05/2017</a:t>
             </a:fld>
             <a:endParaRPr lang="en-GB"/>
           </a:p>
@@ -805,7 +821,7 @@
             <a:fld id="{766BFC5D-BA65-4295-843C-5BFF75191D5F}" type="datetimeFigureOut">
               <a:rPr lang="en-GB" smtClean="0"/>
               <a:pPr/>
-              <a:t>13/04/2016</a:t>
+              <a:t>26/05/2017</a:t>
             </a:fld>
             <a:endParaRPr lang="en-GB"/>
           </a:p>
@@ -1048,7 +1064,7 @@
             <a:fld id="{766BFC5D-BA65-4295-843C-5BFF75191D5F}" type="datetimeFigureOut">
               <a:rPr lang="en-GB" smtClean="0"/>
               <a:pPr/>
-              <a:t>13/04/2016</a:t>
+              <a:t>26/05/2017</a:t>
             </a:fld>
             <a:endParaRPr lang="en-GB"/>
           </a:p>
@@ -1333,7 +1349,7 @@
             <a:fld id="{766BFC5D-BA65-4295-843C-5BFF75191D5F}" type="datetimeFigureOut">
               <a:rPr lang="en-GB" smtClean="0"/>
               <a:pPr/>
-              <a:t>13/04/2016</a:t>
+              <a:t>26/05/2017</a:t>
             </a:fld>
             <a:endParaRPr lang="en-GB"/>
           </a:p>
@@ -1752,7 +1768,7 @@
             <a:fld id="{766BFC5D-BA65-4295-843C-5BFF75191D5F}" type="datetimeFigureOut">
               <a:rPr lang="en-GB" smtClean="0"/>
               <a:pPr/>
-              <a:t>13/04/2016</a:t>
+              <a:t>26/05/2017</a:t>
             </a:fld>
             <a:endParaRPr lang="en-GB"/>
           </a:p>
@@ -1867,7 +1883,7 @@
             <a:fld id="{766BFC5D-BA65-4295-843C-5BFF75191D5F}" type="datetimeFigureOut">
               <a:rPr lang="en-GB" smtClean="0"/>
               <a:pPr/>
-              <a:t>13/04/2016</a:t>
+              <a:t>26/05/2017</a:t>
             </a:fld>
             <a:endParaRPr lang="en-GB"/>
           </a:p>
@@ -1959,7 +1975,7 @@
             <a:fld id="{766BFC5D-BA65-4295-843C-5BFF75191D5F}" type="datetimeFigureOut">
               <a:rPr lang="en-GB" smtClean="0"/>
               <a:pPr/>
-              <a:t>13/04/2016</a:t>
+              <a:t>26/05/2017</a:t>
             </a:fld>
             <a:endParaRPr lang="en-GB"/>
           </a:p>
@@ -2233,7 +2249,7 @@
             <a:fld id="{766BFC5D-BA65-4295-843C-5BFF75191D5F}" type="datetimeFigureOut">
               <a:rPr lang="en-GB" smtClean="0"/>
               <a:pPr/>
-              <a:t>13/04/2016</a:t>
+              <a:t>26/05/2017</a:t>
             </a:fld>
             <a:endParaRPr lang="en-GB"/>
           </a:p>
@@ -2483,7 +2499,7 @@
             <a:fld id="{766BFC5D-BA65-4295-843C-5BFF75191D5F}" type="datetimeFigureOut">
               <a:rPr lang="en-GB" smtClean="0"/>
               <a:pPr/>
-              <a:t>13/04/2016</a:t>
+              <a:t>26/05/2017</a:t>
             </a:fld>
             <a:endParaRPr lang="en-GB"/>
           </a:p>
@@ -2696,7 +2712,7 @@
             <a:fld id="{766BFC5D-BA65-4295-843C-5BFF75191D5F}" type="datetimeFigureOut">
               <a:rPr lang="en-GB" smtClean="0"/>
               <a:pPr/>
-              <a:t>13/04/2016</a:t>
+              <a:t>26/05/2017</a:t>
             </a:fld>
             <a:endParaRPr lang="en-GB"/>
           </a:p>
@@ -3241,11 +3257,7 @@
             </a:r>
             <a:r>
               <a:rPr lang="en-GB" sz="2400" dirty="0" smtClean="0"/>
-              <a:t> </a:t>
-            </a:r>
-            <a:r>
-              <a:rPr lang="en-GB" sz="2400" dirty="0" smtClean="0"/>
-              <a:t>products:</a:t>
+              <a:t> products:</a:t>
             </a:r>
           </a:p>
           <a:p>
@@ -3313,11 +3325,7 @@
             </a:pPr>
             <a:r>
               <a:rPr lang="en-GB" sz="2200" b="1" dirty="0" smtClean="0"/>
-              <a:t>Sepsis </a:t>
-            </a:r>
-            <a:r>
-              <a:rPr lang="en-GB" sz="2200" b="1" dirty="0" smtClean="0"/>
-              <a:t>prediction </a:t>
+              <a:t>Sepsis prediction </a:t>
             </a:r>
             <a:r>
               <a:rPr lang="en-GB" sz="2200" dirty="0" smtClean="0"/>
@@ -3452,11 +3460,7 @@
             </a:r>
             <a:r>
               <a:rPr lang="en-GB" sz="2900" dirty="0" smtClean="0"/>
-              <a:t> based </a:t>
-            </a:r>
-            <a:r>
-              <a:rPr lang="en-GB" sz="2900" dirty="0" smtClean="0"/>
-              <a:t>around a </a:t>
+              <a:t> based around a </a:t>
             </a:r>
             <a:r>
               <a:rPr lang="en-GB" sz="2900" b="1" dirty="0" smtClean="0"/>
@@ -3605,15 +3609,7 @@
                   <a:srgbClr val="FF0000"/>
                 </a:solidFill>
               </a:rPr>
-              <a:t> </a:t>
-            </a:r>
-            <a:r>
-              <a:rPr lang="en-GB" sz="2900" b="1" dirty="0" smtClean="0">
-                <a:solidFill>
-                  <a:srgbClr val="FF0000"/>
-                </a:solidFill>
-              </a:rPr>
-              <a:t>DL </a:t>
+              <a:t> DL </a:t>
             </a:r>
             <a:r>
               <a:rPr lang="en-GB" sz="2900" dirty="0" smtClean="0"/>
@@ -3679,11 +3675,7 @@
             </a:r>
             <a:r>
               <a:rPr lang="en-GB" sz="2500" dirty="0" smtClean="0"/>
-              <a:t> </a:t>
-            </a:r>
-            <a:r>
-              <a:rPr lang="en-GB" sz="2500" dirty="0" smtClean="0"/>
-              <a:t>extends </a:t>
+              <a:t> extends </a:t>
             </a:r>
             <a:r>
               <a:rPr lang="en-GB" sz="2500" b="1" dirty="0" smtClean="0">
@@ -3710,11 +3702,7 @@
             </a:pPr>
             <a:r>
               <a:rPr lang="en-GB" sz="2500" dirty="0" smtClean="0"/>
-              <a:t>E</a:t>
-            </a:r>
-            <a:r>
-              <a:rPr lang="en-GB" sz="2500" dirty="0" smtClean="0"/>
-              <a:t>nables creation of </a:t>
+              <a:t>Enables creation of </a:t>
             </a:r>
             <a:r>
               <a:rPr lang="en-GB" sz="2500" b="1" dirty="0" smtClean="0"/>
@@ -3730,35 +3718,15 @@
                   <a:srgbClr val="1E09B7"/>
                 </a:solidFill>
               </a:rPr>
-              <a:t>object </a:t>
-            </a:r>
-            <a:r>
-              <a:rPr lang="en-GB" sz="2500" b="1" dirty="0" smtClean="0">
-                <a:solidFill>
-                  <a:srgbClr val="1E09B7"/>
-                </a:solidFill>
-              </a:rPr>
-              <a:t>models</a:t>
+              <a:t>object models</a:t>
             </a:r>
             <a:r>
               <a:rPr lang="en-GB" sz="2500" dirty="0" smtClean="0"/>
-              <a:t>,</a:t>
-            </a:r>
-            <a:r>
-              <a:rPr lang="en-GB" sz="2500" dirty="0" smtClean="0"/>
-              <a:t> </a:t>
+              <a:t>, </a:t>
             </a:r>
             <a:r>
               <a:rPr lang="en-GB" sz="2500" b="1" dirty="0" smtClean="0"/>
-              <a:t>b</a:t>
-            </a:r>
-            <a:r>
-              <a:rPr lang="en-GB" sz="2500" b="1" dirty="0" smtClean="0"/>
-              <a:t>ound </a:t>
-            </a:r>
-            <a:r>
-              <a:rPr lang="en-GB" sz="2500" b="1" dirty="0" smtClean="0"/>
-              <a:t>to </a:t>
+              <a:t>bound to </a:t>
             </a:r>
             <a:r>
               <a:rPr lang="en-GB" sz="2500" dirty="0" smtClean="0"/>
@@ -3809,11 +3777,7 @@
             </a:pPr>
             <a:r>
               <a:rPr lang="en-GB" sz="2500" dirty="0" smtClean="0"/>
-              <a:t>Instantiations </a:t>
-            </a:r>
-            <a:r>
-              <a:rPr lang="en-GB" sz="2500" dirty="0" smtClean="0"/>
-              <a:t>of </a:t>
+              <a:t>Instantiations of </a:t>
             </a:r>
             <a:r>
               <a:rPr lang="en-GB" sz="2500" b="1" dirty="0" smtClean="0">
@@ -3833,11 +3797,7 @@
             </a:r>
             <a:r>
               <a:rPr lang="en-GB" sz="2500" dirty="0" smtClean="0"/>
-              <a:t>with instantiations </a:t>
-            </a:r>
-            <a:r>
-              <a:rPr lang="en-GB" sz="2500" dirty="0" smtClean="0"/>
-              <a:t>of bound </a:t>
+              <a:t>with instantiations of bound </a:t>
             </a:r>
             <a:r>
               <a:rPr lang="en-GB" sz="2500" b="1" dirty="0" smtClean="0">
@@ -4075,11 +4035,7 @@
             </a:r>
             <a:r>
               <a:rPr lang="en-GB" sz="2200" dirty="0" smtClean="0"/>
-              <a:t> </a:t>
-            </a:r>
-            <a:r>
-              <a:rPr lang="en-GB" sz="2200" dirty="0" smtClean="0"/>
-              <a:t>(</a:t>
+              <a:t> (</a:t>
             </a:r>
             <a:r>
               <a:rPr lang="en-GB" sz="2200" dirty="0" err="1"/>
@@ -4562,11 +4518,7 @@
             </a:r>
             <a:r>
               <a:rPr lang="en-GB" sz="2700" b="1" dirty="0" smtClean="0"/>
-              <a:t>layered </a:t>
-            </a:r>
-            <a:r>
-              <a:rPr lang="en-GB" sz="2700" b="1" dirty="0" smtClean="0"/>
-              <a:t>architecture</a:t>
+              <a:t>layered architecture</a:t>
             </a:r>
             <a:r>
               <a:rPr lang="en-GB" sz="2700" dirty="0" smtClean="0"/>
@@ -4580,13 +4532,8 @@
             </a:pPr>
             <a:r>
               <a:rPr lang="en-GB" sz="2600" dirty="0" smtClean="0"/>
-              <a:t>Structured means of </a:t>
-            </a:r>
-            <a:r>
-              <a:rPr lang="en-GB" sz="2600" dirty="0" smtClean="0"/>
-              <a:t>combining:</a:t>
-            </a:r>
-            <a:endParaRPr lang="en-GB" sz="2600" dirty="0" smtClean="0"/>
+              <a:t>Structured means of combining:</a:t>
+            </a:r>
           </a:p>
           <a:p>
             <a:pPr marL="1314450" lvl="2" indent="-457200">
@@ -4604,27 +4551,19 @@
                   <a:srgbClr val="FF0000"/>
                 </a:solidFill>
               </a:rPr>
-              <a:t>Generic </a:t>
-            </a:r>
-            <a:r>
-              <a:rPr lang="en-GB" b="1" dirty="0" smtClean="0">
-                <a:solidFill>
-                  <a:srgbClr val="FF0000"/>
-                </a:solidFill>
-              </a:rPr>
-              <a:t>knowledge sources</a:t>
+              <a:t>Generic knowledge sources</a:t>
             </a:r>
             <a:r>
               <a:rPr lang="en-GB" dirty="0" smtClean="0"/>
               <a:t> + </a:t>
             </a:r>
             <a:r>
-              <a:rPr lang="en-GB" b="1" dirty="0" err="1" smtClean="0">
+              <a:rPr lang="en-GB" b="1" dirty="0" smtClean="0">
                 <a:solidFill>
                   <a:srgbClr val="FF0000"/>
                 </a:solidFill>
               </a:rPr>
-              <a:t>reasonners</a:t>
+              <a:t>reasoners</a:t>
             </a:r>
             <a:endParaRPr lang="en-GB" b="1" dirty="0" smtClean="0">
               <a:solidFill>
@@ -4648,23 +4587,7 @@
                   <a:srgbClr val="1E09B7"/>
                 </a:solidFill>
               </a:rPr>
-              <a:t>Dom</a:t>
-            </a:r>
-            <a:r>
-              <a:rPr lang="en-GB" b="1" dirty="0" smtClean="0">
-                <a:solidFill>
-                  <a:srgbClr val="1E09B7"/>
-                </a:solidFill>
-              </a:rPr>
-              <a:t>ain-specific </a:t>
-            </a:r>
-            <a:r>
-              <a:rPr lang="en-GB" b="1" dirty="0" smtClean="0">
-                <a:solidFill>
-                  <a:srgbClr val="1E09B7"/>
-                </a:solidFill>
-              </a:rPr>
-              <a:t>processing</a:t>
+              <a:t>Domain-specific processing</a:t>
             </a:r>
           </a:p>
           <a:p>
@@ -4694,7 +4617,6 @@
               <a:rPr lang="en-GB" sz="2700" dirty="0" smtClean="0"/>
               <a:t>:</a:t>
             </a:r>
-            <a:endParaRPr lang="en-GB" sz="2700" dirty="0" smtClean="0"/>
           </a:p>
           <a:p>
             <a:pPr marL="971550" lvl="1" indent="-514350">
@@ -5488,7 +5410,6 @@
               <a:rPr lang="en-GB" sz="6600" dirty="0" smtClean="0"/>
               <a:t>demo</a:t>
             </a:r>
-            <a:endParaRPr lang="en-GB" sz="6600" dirty="0" smtClean="0"/>
           </a:p>
           <a:p>
             <a:pPr>

</xml_diff>